<commit_message>
update workflow figure slides
</commit_message>
<xml_diff>
--- a/docs/images/workflow.pptx
+++ b/docs/images/workflow.pptx
@@ -7,6 +7,7 @@
   <p:sldIdLst>
     <p:sldId id="256" r:id="rId2"/>
     <p:sldId id="257" r:id="rId3"/>
+    <p:sldId id="258" r:id="rId4"/>
   </p:sldIdLst>
   <p:sldSz cx="13746163" cy="9144000"/>
   <p:notesSz cx="6858000" cy="9144000"/>
@@ -244,7 +245,7 @@
           <a:p>
             <a:fld id="{C415CA74-3952-BD4B-AE8D-88D35F82BC16}" type="datetimeFigureOut">
               <a:rPr lang="en-US" smtClean="0"/>
-              <a:t>2/2/21</a:t>
+              <a:t>3/3/21</a:t>
             </a:fld>
             <a:endParaRPr lang="en-US"/>
           </a:p>
@@ -414,7 +415,7 @@
           <a:p>
             <a:fld id="{C415CA74-3952-BD4B-AE8D-88D35F82BC16}" type="datetimeFigureOut">
               <a:rPr lang="en-US" smtClean="0"/>
-              <a:t>2/2/21</a:t>
+              <a:t>3/3/21</a:t>
             </a:fld>
             <a:endParaRPr lang="en-US"/>
           </a:p>
@@ -594,7 +595,7 @@
           <a:p>
             <a:fld id="{C415CA74-3952-BD4B-AE8D-88D35F82BC16}" type="datetimeFigureOut">
               <a:rPr lang="en-US" smtClean="0"/>
-              <a:t>2/2/21</a:t>
+              <a:t>3/3/21</a:t>
             </a:fld>
             <a:endParaRPr lang="en-US"/>
           </a:p>
@@ -764,7 +765,7 @@
           <a:p>
             <a:fld id="{C415CA74-3952-BD4B-AE8D-88D35F82BC16}" type="datetimeFigureOut">
               <a:rPr lang="en-US" smtClean="0"/>
-              <a:t>2/2/21</a:t>
+              <a:t>3/3/21</a:t>
             </a:fld>
             <a:endParaRPr lang="en-US"/>
           </a:p>
@@ -1008,7 +1009,7 @@
           <a:p>
             <a:fld id="{C415CA74-3952-BD4B-AE8D-88D35F82BC16}" type="datetimeFigureOut">
               <a:rPr lang="en-US" smtClean="0"/>
-              <a:t>2/2/21</a:t>
+              <a:t>3/3/21</a:t>
             </a:fld>
             <a:endParaRPr lang="en-US"/>
           </a:p>
@@ -1240,7 +1241,7 @@
           <a:p>
             <a:fld id="{C415CA74-3952-BD4B-AE8D-88D35F82BC16}" type="datetimeFigureOut">
               <a:rPr lang="en-US" smtClean="0"/>
-              <a:t>2/2/21</a:t>
+              <a:t>3/3/21</a:t>
             </a:fld>
             <a:endParaRPr lang="en-US"/>
           </a:p>
@@ -1607,7 +1608,7 @@
           <a:p>
             <a:fld id="{C415CA74-3952-BD4B-AE8D-88D35F82BC16}" type="datetimeFigureOut">
               <a:rPr lang="en-US" smtClean="0"/>
-              <a:t>2/2/21</a:t>
+              <a:t>3/3/21</a:t>
             </a:fld>
             <a:endParaRPr lang="en-US"/>
           </a:p>
@@ -1725,7 +1726,7 @@
           <a:p>
             <a:fld id="{C415CA74-3952-BD4B-AE8D-88D35F82BC16}" type="datetimeFigureOut">
               <a:rPr lang="en-US" smtClean="0"/>
-              <a:t>2/2/21</a:t>
+              <a:t>3/3/21</a:t>
             </a:fld>
             <a:endParaRPr lang="en-US"/>
           </a:p>
@@ -1820,7 +1821,7 @@
           <a:p>
             <a:fld id="{C415CA74-3952-BD4B-AE8D-88D35F82BC16}" type="datetimeFigureOut">
               <a:rPr lang="en-US" smtClean="0"/>
-              <a:t>2/2/21</a:t>
+              <a:t>3/3/21</a:t>
             </a:fld>
             <a:endParaRPr lang="en-US"/>
           </a:p>
@@ -2097,7 +2098,7 @@
           <a:p>
             <a:fld id="{C415CA74-3952-BD4B-AE8D-88D35F82BC16}" type="datetimeFigureOut">
               <a:rPr lang="en-US" smtClean="0"/>
-              <a:t>2/2/21</a:t>
+              <a:t>3/3/21</a:t>
             </a:fld>
             <a:endParaRPr lang="en-US"/>
           </a:p>
@@ -2354,7 +2355,7 @@
           <a:p>
             <a:fld id="{C415CA74-3952-BD4B-AE8D-88D35F82BC16}" type="datetimeFigureOut">
               <a:rPr lang="en-US" smtClean="0"/>
-              <a:t>2/2/21</a:t>
+              <a:t>3/3/21</a:t>
             </a:fld>
             <a:endParaRPr lang="en-US"/>
           </a:p>
@@ -2567,7 +2568,7 @@
           <a:p>
             <a:fld id="{C415CA74-3952-BD4B-AE8D-88D35F82BC16}" type="datetimeFigureOut">
               <a:rPr lang="en-US" smtClean="0"/>
-              <a:t>2/2/21</a:t>
+              <a:t>3/3/21</a:t>
             </a:fld>
             <a:endParaRPr lang="en-US"/>
           </a:p>
@@ -7707,6 +7708,2886 @@
 </p:sld>
 </file>
 
+<file path=ppt/slides/slide3.xml><?xml version="1.0" encoding="utf-8"?>
+<p:sld xmlns:a="http://schemas.openxmlformats.org/drawingml/2006/main" xmlns:r="http://schemas.openxmlformats.org/officeDocument/2006/relationships" xmlns:p="http://schemas.openxmlformats.org/presentationml/2006/main">
+  <p:cSld>
+    <p:spTree>
+      <p:nvGrpSpPr>
+        <p:cNvPr id="1" name=""/>
+        <p:cNvGrpSpPr/>
+        <p:nvPr/>
+      </p:nvGrpSpPr>
+      <p:grpSpPr>
+        <a:xfrm>
+          <a:off x="0" y="0"/>
+          <a:ext cx="0" cy="0"/>
+          <a:chOff x="0" y="0"/>
+          <a:chExt cx="0" cy="0"/>
+        </a:xfrm>
+      </p:grpSpPr>
+      <p:pic>
+        <p:nvPicPr>
+          <p:cNvPr id="30" name="Picture 16" descr="https://documents.lucidchart.com/documents/6368cd09-01fe-4ea0-83a3-f9698b687ee4/pages/0_0?a=1699&amp;x=1030&amp;y=970&amp;w=228&amp;h=228&amp;store=1&amp;accept=image%2F*&amp;auth=LCA%20cdeee157b25ee3ce4fa4fca389a8398edca29a4f-ts%3D1571535957">
+            <a:extLst>
+              <a:ext uri="{FF2B5EF4-FFF2-40B4-BE49-F238E27FC236}">
+                <a16:creationId xmlns:a16="http://schemas.microsoft.com/office/drawing/2014/main" id="{EBFB93E9-D494-5E4F-8313-3BCD198696D9}"/>
+              </a:ext>
+            </a:extLst>
+          </p:cNvPr>
+          <p:cNvPicPr>
+            <a:picLocks noChangeAspect="1" noChangeArrowheads="1"/>
+          </p:cNvPicPr>
+          <p:nvPr/>
+        </p:nvPicPr>
+        <p:blipFill>
+          <a:blip r:embed="rId2">
+            <a:extLst>
+              <a:ext uri="{28A0092B-C50C-407E-A947-70E740481C1C}">
+                <a14:useLocalDpi xmlns:a14="http://schemas.microsoft.com/office/drawing/2010/main" val="0"/>
+              </a:ext>
+            </a:extLst>
+          </a:blip>
+          <a:srcRect/>
+          <a:stretch>
+            <a:fillRect/>
+          </a:stretch>
+        </p:blipFill>
+        <p:spPr bwMode="auto">
+          <a:xfrm>
+            <a:off x="11376427" y="1986345"/>
+            <a:ext cx="1559060" cy="1559060"/>
+          </a:xfrm>
+          <a:prstGeom prst="rect">
+            <a:avLst/>
+          </a:prstGeom>
+          <a:noFill/>
+          <a:extLst>
+            <a:ext uri="{909E8E84-426E-40DD-AFC4-6F175D3DCCD1}">
+              <a14:hiddenFill xmlns:a14="http://schemas.microsoft.com/office/drawing/2010/main">
+                <a:solidFill>
+                  <a:srgbClr val="FFFFFF"/>
+                </a:solidFill>
+              </a14:hiddenFill>
+            </a:ext>
+          </a:extLst>
+        </p:spPr>
+      </p:pic>
+      <p:sp>
+        <p:nvSpPr>
+          <p:cNvPr id="4" name="Rounded Rectangle 3">
+            <a:extLst>
+              <a:ext uri="{FF2B5EF4-FFF2-40B4-BE49-F238E27FC236}">
+                <a16:creationId xmlns:a16="http://schemas.microsoft.com/office/drawing/2014/main" id="{70A49B9D-02AC-804D-AB35-B95D64AB1A9F}"/>
+              </a:ext>
+            </a:extLst>
+          </p:cNvPr>
+          <p:cNvSpPr/>
+          <p:nvPr/>
+        </p:nvSpPr>
+        <p:spPr>
+          <a:xfrm>
+            <a:off x="3066336" y="1812918"/>
+            <a:ext cx="9955183" cy="5344737"/>
+          </a:xfrm>
+          <a:prstGeom prst="roundRect">
+            <a:avLst/>
+          </a:prstGeom>
+          <a:noFill/>
+          <a:ln w="38100">
+            <a:solidFill>
+              <a:srgbClr val="FF0000"/>
+            </a:solidFill>
+            <a:prstDash val="dash"/>
+          </a:ln>
+        </p:spPr>
+        <p:style>
+          <a:lnRef idx="2">
+            <a:schemeClr val="accent6"/>
+          </a:lnRef>
+          <a:fillRef idx="1">
+            <a:schemeClr val="lt1"/>
+          </a:fillRef>
+          <a:effectRef idx="0">
+            <a:schemeClr val="accent6"/>
+          </a:effectRef>
+          <a:fontRef idx="minor">
+            <a:schemeClr val="dk1"/>
+          </a:fontRef>
+        </p:style>
+        <p:txBody>
+          <a:bodyPr rtlCol="0" anchor="ctr"/>
+          <a:lstStyle/>
+          <a:p>
+            <a:pPr algn="ctr"/>
+            <a:endParaRPr lang="en-US" dirty="0"/>
+          </a:p>
+        </p:txBody>
+      </p:sp>
+      <p:sp>
+        <p:nvSpPr>
+          <p:cNvPr id="5" name="Rounded Rectangle 4">
+            <a:extLst>
+              <a:ext uri="{FF2B5EF4-FFF2-40B4-BE49-F238E27FC236}">
+                <a16:creationId xmlns:a16="http://schemas.microsoft.com/office/drawing/2014/main" id="{992A31C1-2292-E549-88B4-5688F8A02BB3}"/>
+              </a:ext>
+            </a:extLst>
+          </p:cNvPr>
+          <p:cNvSpPr/>
+          <p:nvPr/>
+        </p:nvSpPr>
+        <p:spPr>
+          <a:xfrm>
+            <a:off x="280567" y="4891726"/>
+            <a:ext cx="991981" cy="1379095"/>
+          </a:xfrm>
+          <a:prstGeom prst="roundRect">
+            <a:avLst/>
+          </a:prstGeom>
+          <a:ln w="38100">
+            <a:solidFill>
+              <a:srgbClr val="FF0000"/>
+            </a:solidFill>
+          </a:ln>
+        </p:spPr>
+        <p:style>
+          <a:lnRef idx="2">
+            <a:schemeClr val="accent2"/>
+          </a:lnRef>
+          <a:fillRef idx="1">
+            <a:schemeClr val="lt1"/>
+          </a:fillRef>
+          <a:effectRef idx="0">
+            <a:schemeClr val="accent2"/>
+          </a:effectRef>
+          <a:fontRef idx="minor">
+            <a:schemeClr val="dk1"/>
+          </a:fontRef>
+        </p:style>
+        <p:txBody>
+          <a:bodyPr rtlCol="0" anchor="ctr"/>
+          <a:lstStyle/>
+          <a:p>
+            <a:pPr algn="ctr"/>
+            <a:endParaRPr lang="en-US" sz="1100" dirty="0"/>
+          </a:p>
+          <a:p>
+            <a:pPr algn="ctr"/>
+            <a:endParaRPr lang="en-US" sz="1100" dirty="0"/>
+          </a:p>
+          <a:p>
+            <a:pPr algn="ctr"/>
+            <a:endParaRPr lang="en-US" sz="1100" dirty="0"/>
+          </a:p>
+          <a:p>
+            <a:pPr algn="ctr"/>
+            <a:endParaRPr lang="en-US" sz="1100" dirty="0"/>
+          </a:p>
+          <a:p>
+            <a:pPr algn="ctr"/>
+            <a:endParaRPr lang="en-US" sz="1100" dirty="0"/>
+          </a:p>
+          <a:p>
+            <a:pPr algn="ctr"/>
+            <a:r>
+              <a:rPr lang="en-US" sz="1100" dirty="0"/>
+              <a:t>Sample Preparation</a:t>
+            </a:r>
+          </a:p>
+        </p:txBody>
+      </p:sp>
+      <p:pic>
+        <p:nvPicPr>
+          <p:cNvPr id="6" name="Picture 5" descr="https://documents.lucidchart.com/documents/966fbf01-d9b7-4749-8747-a6a4ed470af1/pages/0_0?a=432&amp;x=972&amp;y=132&amp;w=168&amp;h=176&amp;store=1&amp;accept=image%2F*&amp;auth=LCA%206e2750aa87be5669f8761a236447553de47d667a-ts%3D1587754664">
+            <a:extLst>
+              <a:ext uri="{FF2B5EF4-FFF2-40B4-BE49-F238E27FC236}">
+                <a16:creationId xmlns:a16="http://schemas.microsoft.com/office/drawing/2014/main" id="{8DE96C02-1DDF-974D-8DA7-E6CA877B6930}"/>
+              </a:ext>
+            </a:extLst>
+          </p:cNvPr>
+          <p:cNvPicPr>
+            <a:picLocks noChangeAspect="1" noChangeArrowheads="1"/>
+          </p:cNvPicPr>
+          <p:nvPr/>
+        </p:nvPicPr>
+        <p:blipFill>
+          <a:blip r:embed="rId3">
+            <a:extLst>
+              <a:ext uri="{28A0092B-C50C-407E-A947-70E740481C1C}">
+                <a14:useLocalDpi xmlns:a14="http://schemas.microsoft.com/office/drawing/2010/main" val="0"/>
+              </a:ext>
+            </a:extLst>
+          </a:blip>
+          <a:srcRect/>
+          <a:stretch>
+            <a:fillRect/>
+          </a:stretch>
+        </p:blipFill>
+        <p:spPr bwMode="auto">
+          <a:xfrm>
+            <a:off x="402739" y="4984373"/>
+            <a:ext cx="747635" cy="783237"/>
+          </a:xfrm>
+          <a:prstGeom prst="rect">
+            <a:avLst/>
+          </a:prstGeom>
+          <a:noFill/>
+          <a:extLst>
+            <a:ext uri="{909E8E84-426E-40DD-AFC4-6F175D3DCCD1}">
+              <a14:hiddenFill xmlns:a14="http://schemas.microsoft.com/office/drawing/2010/main">
+                <a:solidFill>
+                  <a:srgbClr val="FFFFFF"/>
+                </a:solidFill>
+              </a14:hiddenFill>
+            </a:ext>
+          </a:extLst>
+        </p:spPr>
+      </p:pic>
+      <p:sp>
+        <p:nvSpPr>
+          <p:cNvPr id="7" name="Rounded Rectangle 6">
+            <a:extLst>
+              <a:ext uri="{FF2B5EF4-FFF2-40B4-BE49-F238E27FC236}">
+                <a16:creationId xmlns:a16="http://schemas.microsoft.com/office/drawing/2014/main" id="{97D0F08F-7510-9E4E-AB51-661E67746A32}"/>
+              </a:ext>
+            </a:extLst>
+          </p:cNvPr>
+          <p:cNvSpPr/>
+          <p:nvPr/>
+        </p:nvSpPr>
+        <p:spPr>
+          <a:xfrm>
+            <a:off x="1603399" y="4891726"/>
+            <a:ext cx="991981" cy="1379095"/>
+          </a:xfrm>
+          <a:prstGeom prst="roundRect">
+            <a:avLst/>
+          </a:prstGeom>
+          <a:ln w="38100">
+            <a:solidFill>
+              <a:srgbClr val="FF0000"/>
+            </a:solidFill>
+          </a:ln>
+        </p:spPr>
+        <p:style>
+          <a:lnRef idx="2">
+            <a:schemeClr val="accent2"/>
+          </a:lnRef>
+          <a:fillRef idx="1">
+            <a:schemeClr val="lt1"/>
+          </a:fillRef>
+          <a:effectRef idx="0">
+            <a:schemeClr val="accent2"/>
+          </a:effectRef>
+          <a:fontRef idx="minor">
+            <a:schemeClr val="dk1"/>
+          </a:fontRef>
+        </p:style>
+        <p:txBody>
+          <a:bodyPr rtlCol="0" anchor="ctr"/>
+          <a:lstStyle/>
+          <a:p>
+            <a:pPr algn="ctr"/>
+            <a:endParaRPr lang="en-US" sz="1100" dirty="0"/>
+          </a:p>
+          <a:p>
+            <a:pPr algn="ctr"/>
+            <a:endParaRPr lang="en-US" sz="1100" dirty="0"/>
+          </a:p>
+          <a:p>
+            <a:pPr algn="ctr"/>
+            <a:endParaRPr lang="en-US" sz="1100" dirty="0"/>
+          </a:p>
+          <a:p>
+            <a:pPr algn="ctr"/>
+            <a:endParaRPr lang="en-US" sz="1100" dirty="0"/>
+          </a:p>
+          <a:p>
+            <a:pPr algn="ctr"/>
+            <a:endParaRPr lang="en-US" sz="1100" dirty="0"/>
+          </a:p>
+          <a:p>
+            <a:pPr algn="ctr"/>
+            <a:r>
+              <a:rPr lang="en-US" sz="1100" dirty="0"/>
+              <a:t>LC-HRMS</a:t>
+            </a:r>
+          </a:p>
+        </p:txBody>
+      </p:sp>
+      <p:pic>
+        <p:nvPicPr>
+          <p:cNvPr id="8" name="Picture 7" descr="https://documents.lucidchart.com/documents/966fbf01-d9b7-4749-8747-a6a4ed470af1/pages/0_0?a=435&amp;x=962&amp;y=324&amp;w=189&amp;h=290&amp;store=1&amp;accept=image%2F*&amp;auth=LCA%2053be1e64f183a5e47bd79ffbf0a3e005a81eb5da-ts%3D1587754664">
+            <a:extLst>
+              <a:ext uri="{FF2B5EF4-FFF2-40B4-BE49-F238E27FC236}">
+                <a16:creationId xmlns:a16="http://schemas.microsoft.com/office/drawing/2014/main" id="{C45B9797-528E-B14C-A438-6BF650ECEB2F}"/>
+              </a:ext>
+            </a:extLst>
+          </p:cNvPr>
+          <p:cNvPicPr>
+            <a:picLocks noChangeAspect="1" noChangeArrowheads="1"/>
+          </p:cNvPicPr>
+          <p:nvPr/>
+        </p:nvPicPr>
+        <p:blipFill>
+          <a:blip r:embed="rId4">
+            <a:extLst>
+              <a:ext uri="{28A0092B-C50C-407E-A947-70E740481C1C}">
+                <a14:useLocalDpi xmlns:a14="http://schemas.microsoft.com/office/drawing/2010/main" val="0"/>
+              </a:ext>
+            </a:extLst>
+          </a:blip>
+          <a:srcRect/>
+          <a:stretch>
+            <a:fillRect/>
+          </a:stretch>
+        </p:blipFill>
+        <p:spPr bwMode="auto">
+          <a:xfrm>
+            <a:off x="1805597" y="4984373"/>
+            <a:ext cx="619027" cy="950337"/>
+          </a:xfrm>
+          <a:prstGeom prst="rect">
+            <a:avLst/>
+          </a:prstGeom>
+          <a:noFill/>
+          <a:extLst>
+            <a:ext uri="{909E8E84-426E-40DD-AFC4-6F175D3DCCD1}">
+              <a14:hiddenFill xmlns:a14="http://schemas.microsoft.com/office/drawing/2010/main">
+                <a:solidFill>
+                  <a:srgbClr val="FFFFFF"/>
+                </a:solidFill>
+              </a14:hiddenFill>
+            </a:ext>
+          </a:extLst>
+        </p:spPr>
+      </p:pic>
+      <p:sp>
+        <p:nvSpPr>
+          <p:cNvPr id="9" name="Rounded Rectangle 8">
+            <a:extLst>
+              <a:ext uri="{FF2B5EF4-FFF2-40B4-BE49-F238E27FC236}">
+                <a16:creationId xmlns:a16="http://schemas.microsoft.com/office/drawing/2014/main" id="{F660D553-7880-004C-AF06-A47EBF867592}"/>
+              </a:ext>
+            </a:extLst>
+          </p:cNvPr>
+          <p:cNvSpPr/>
+          <p:nvPr/>
+        </p:nvSpPr>
+        <p:spPr>
+          <a:xfrm>
+            <a:off x="4925719" y="3556416"/>
+            <a:ext cx="1648019" cy="1379095"/>
+          </a:xfrm>
+          <a:prstGeom prst="roundRect">
+            <a:avLst/>
+          </a:prstGeom>
+          <a:ln w="38100">
+            <a:solidFill>
+              <a:srgbClr val="FF0000"/>
+            </a:solidFill>
+          </a:ln>
+        </p:spPr>
+        <p:style>
+          <a:lnRef idx="2">
+            <a:schemeClr val="accent2"/>
+          </a:lnRef>
+          <a:fillRef idx="1">
+            <a:schemeClr val="lt1"/>
+          </a:fillRef>
+          <a:effectRef idx="0">
+            <a:schemeClr val="accent2"/>
+          </a:effectRef>
+          <a:fontRef idx="minor">
+            <a:schemeClr val="dk1"/>
+          </a:fontRef>
+        </p:style>
+        <p:txBody>
+          <a:bodyPr rtlCol="0" anchor="ctr"/>
+          <a:lstStyle/>
+          <a:p>
+            <a:pPr algn="ctr"/>
+            <a:endParaRPr lang="en-US" sz="1100" dirty="0"/>
+          </a:p>
+          <a:p>
+            <a:pPr algn="ctr"/>
+            <a:endParaRPr lang="en-US" sz="1100" dirty="0"/>
+          </a:p>
+          <a:p>
+            <a:pPr algn="ctr"/>
+            <a:endParaRPr lang="en-US" sz="1100" dirty="0"/>
+          </a:p>
+          <a:p>
+            <a:pPr algn="ctr"/>
+            <a:endParaRPr lang="en-US" sz="1100" dirty="0"/>
+          </a:p>
+          <a:p>
+            <a:pPr algn="ctr"/>
+            <a:endParaRPr lang="en-US" sz="1100" dirty="0"/>
+          </a:p>
+          <a:p>
+            <a:pPr algn="ctr"/>
+            <a:r>
+              <a:rPr lang="en-US" sz="1100" dirty="0"/>
+              <a:t>Converted Files</a:t>
+            </a:r>
+          </a:p>
+        </p:txBody>
+      </p:sp>
+      <p:pic>
+        <p:nvPicPr>
+          <p:cNvPr id="10" name="Picture 9">
+            <a:extLst>
+              <a:ext uri="{FF2B5EF4-FFF2-40B4-BE49-F238E27FC236}">
+                <a16:creationId xmlns:a16="http://schemas.microsoft.com/office/drawing/2014/main" id="{B0C70DFD-98D8-A047-BAEB-E8316D5EA547}"/>
+              </a:ext>
+            </a:extLst>
+          </p:cNvPr>
+          <p:cNvPicPr>
+            <a:picLocks noChangeAspect="1"/>
+          </p:cNvPicPr>
+          <p:nvPr/>
+        </p:nvPicPr>
+        <p:blipFill>
+          <a:blip r:embed="rId5"/>
+          <a:stretch>
+            <a:fillRect/>
+          </a:stretch>
+        </p:blipFill>
+        <p:spPr>
+          <a:xfrm>
+            <a:off x="5068788" y="3745248"/>
+            <a:ext cx="1337310" cy="786653"/>
+          </a:xfrm>
+          <a:prstGeom prst="rect">
+            <a:avLst/>
+          </a:prstGeom>
+        </p:spPr>
+      </p:pic>
+      <p:sp>
+        <p:nvSpPr>
+          <p:cNvPr id="11" name="Rounded Rectangle 10">
+            <a:extLst>
+              <a:ext uri="{FF2B5EF4-FFF2-40B4-BE49-F238E27FC236}">
+                <a16:creationId xmlns:a16="http://schemas.microsoft.com/office/drawing/2014/main" id="{E7D4245C-00B3-BB44-801C-3264691E47B9}"/>
+              </a:ext>
+            </a:extLst>
+          </p:cNvPr>
+          <p:cNvSpPr/>
+          <p:nvPr/>
+        </p:nvSpPr>
+        <p:spPr>
+          <a:xfrm>
+            <a:off x="6904589" y="3775480"/>
+            <a:ext cx="1913404" cy="1160032"/>
+          </a:xfrm>
+          <a:prstGeom prst="roundRect">
+            <a:avLst/>
+          </a:prstGeom>
+          <a:ln w="38100">
+            <a:solidFill>
+              <a:srgbClr val="FF0000"/>
+            </a:solidFill>
+          </a:ln>
+        </p:spPr>
+        <p:style>
+          <a:lnRef idx="2">
+            <a:schemeClr val="accent2"/>
+          </a:lnRef>
+          <a:fillRef idx="1">
+            <a:schemeClr val="lt1"/>
+          </a:fillRef>
+          <a:effectRef idx="0">
+            <a:schemeClr val="accent2"/>
+          </a:effectRef>
+          <a:fontRef idx="minor">
+            <a:schemeClr val="dk1"/>
+          </a:fontRef>
+        </p:style>
+        <p:txBody>
+          <a:bodyPr rtlCol="0" anchor="ctr"/>
+          <a:lstStyle/>
+          <a:p>
+            <a:pPr algn="ctr"/>
+            <a:endParaRPr lang="en-US" sz="1100" dirty="0"/>
+          </a:p>
+          <a:p>
+            <a:pPr algn="ctr"/>
+            <a:endParaRPr lang="en-US" sz="1100" dirty="0"/>
+          </a:p>
+          <a:p>
+            <a:pPr algn="ctr"/>
+            <a:endParaRPr lang="en-US" sz="1100" dirty="0"/>
+          </a:p>
+          <a:p>
+            <a:pPr algn="ctr"/>
+            <a:endParaRPr lang="en-US" sz="1100" dirty="0"/>
+          </a:p>
+          <a:p>
+            <a:pPr algn="ctr"/>
+            <a:r>
+              <a:rPr lang="en-US" sz="1100" dirty="0"/>
+              <a:t>Data Processing &amp; Metabolites Annotation</a:t>
+            </a:r>
+          </a:p>
+        </p:txBody>
+      </p:sp>
+      <p:pic>
+        <p:nvPicPr>
+          <p:cNvPr id="12" name="Picture 18" descr="Image result for MzMine logo">
+            <a:extLst>
+              <a:ext uri="{FF2B5EF4-FFF2-40B4-BE49-F238E27FC236}">
+                <a16:creationId xmlns:a16="http://schemas.microsoft.com/office/drawing/2014/main" id="{B0B95AC1-DAB1-A443-AA21-E94C98DB93C8}"/>
+              </a:ext>
+            </a:extLst>
+          </p:cNvPr>
+          <p:cNvPicPr>
+            <a:picLocks noChangeAspect="1" noChangeArrowheads="1"/>
+          </p:cNvPicPr>
+          <p:nvPr/>
+        </p:nvPicPr>
+        <p:blipFill>
+          <a:blip r:embed="rId6">
+            <a:extLst>
+              <a:ext uri="{28A0092B-C50C-407E-A947-70E740481C1C}">
+                <a14:useLocalDpi xmlns:a14="http://schemas.microsoft.com/office/drawing/2010/main" val="0"/>
+              </a:ext>
+            </a:extLst>
+          </a:blip>
+          <a:srcRect/>
+          <a:stretch>
+            <a:fillRect/>
+          </a:stretch>
+        </p:blipFill>
+        <p:spPr bwMode="auto">
+          <a:xfrm>
+            <a:off x="7036144" y="3876080"/>
+            <a:ext cx="988736" cy="229299"/>
+          </a:xfrm>
+          <a:prstGeom prst="rect">
+            <a:avLst/>
+          </a:prstGeom>
+          <a:noFill/>
+          <a:extLst>
+            <a:ext uri="{909E8E84-426E-40DD-AFC4-6F175D3DCCD1}">
+              <a14:hiddenFill xmlns:a14="http://schemas.microsoft.com/office/drawing/2010/main">
+                <a:solidFill>
+                  <a:srgbClr val="FFFFFF"/>
+                </a:solidFill>
+              </a14:hiddenFill>
+            </a:ext>
+          </a:extLst>
+        </p:spPr>
+      </p:pic>
+      <p:sp>
+        <p:nvSpPr>
+          <p:cNvPr id="13" name="Rounded Rectangle 12">
+            <a:extLst>
+              <a:ext uri="{FF2B5EF4-FFF2-40B4-BE49-F238E27FC236}">
+                <a16:creationId xmlns:a16="http://schemas.microsoft.com/office/drawing/2014/main" id="{B0B46D59-0466-5442-926C-16E67BD8BAA8}"/>
+              </a:ext>
+            </a:extLst>
+          </p:cNvPr>
+          <p:cNvSpPr/>
+          <p:nvPr/>
+        </p:nvSpPr>
+        <p:spPr>
+          <a:xfrm>
+            <a:off x="9287906" y="3742197"/>
+            <a:ext cx="1648019" cy="1070219"/>
+          </a:xfrm>
+          <a:prstGeom prst="roundRect">
+            <a:avLst/>
+          </a:prstGeom>
+          <a:ln w="38100">
+            <a:solidFill>
+              <a:srgbClr val="FF0000"/>
+            </a:solidFill>
+          </a:ln>
+        </p:spPr>
+        <p:style>
+          <a:lnRef idx="2">
+            <a:schemeClr val="accent2"/>
+          </a:lnRef>
+          <a:fillRef idx="1">
+            <a:schemeClr val="lt1"/>
+          </a:fillRef>
+          <a:effectRef idx="0">
+            <a:schemeClr val="accent2"/>
+          </a:effectRef>
+          <a:fontRef idx="minor">
+            <a:schemeClr val="dk1"/>
+          </a:fontRef>
+        </p:style>
+        <p:txBody>
+          <a:bodyPr rtlCol="0" anchor="ctr"/>
+          <a:lstStyle/>
+          <a:p>
+            <a:pPr algn="ctr"/>
+            <a:endParaRPr lang="en-US" sz="1100" dirty="0"/>
+          </a:p>
+          <a:p>
+            <a:pPr algn="ctr"/>
+            <a:endParaRPr lang="en-US" sz="1100" dirty="0"/>
+          </a:p>
+          <a:p>
+            <a:pPr algn="ctr"/>
+            <a:endParaRPr lang="en-US" sz="1100" dirty="0"/>
+          </a:p>
+          <a:p>
+            <a:pPr algn="ctr"/>
+            <a:r>
+              <a:rPr lang="en-US" sz="1100" dirty="0"/>
+              <a:t>File Format Transformation</a:t>
+            </a:r>
+          </a:p>
+        </p:txBody>
+      </p:sp>
+      <p:pic>
+        <p:nvPicPr>
+          <p:cNvPr id="14" name="Picture 10" descr="The Python Logo | Python Software Foundation">
+            <a:extLst>
+              <a:ext uri="{FF2B5EF4-FFF2-40B4-BE49-F238E27FC236}">
+                <a16:creationId xmlns:a16="http://schemas.microsoft.com/office/drawing/2014/main" id="{90D133E5-05B3-E349-8857-AF6D9EC001CC}"/>
+              </a:ext>
+            </a:extLst>
+          </p:cNvPr>
+          <p:cNvPicPr>
+            <a:picLocks noChangeAspect="1" noChangeArrowheads="1"/>
+          </p:cNvPicPr>
+          <p:nvPr/>
+        </p:nvPicPr>
+        <p:blipFill>
+          <a:blip r:embed="rId7">
+            <a:extLst>
+              <a:ext uri="{28A0092B-C50C-407E-A947-70E740481C1C}">
+                <a14:useLocalDpi xmlns:a14="http://schemas.microsoft.com/office/drawing/2010/main" val="0"/>
+              </a:ext>
+            </a:extLst>
+          </a:blip>
+          <a:srcRect/>
+          <a:stretch>
+            <a:fillRect/>
+          </a:stretch>
+        </p:blipFill>
+        <p:spPr bwMode="auto">
+          <a:xfrm>
+            <a:off x="9358246" y="3807926"/>
+            <a:ext cx="1518973" cy="513064"/>
+          </a:xfrm>
+          <a:prstGeom prst="rect">
+            <a:avLst/>
+          </a:prstGeom>
+          <a:noFill/>
+          <a:extLst>
+            <a:ext uri="{909E8E84-426E-40DD-AFC4-6F175D3DCCD1}">
+              <a14:hiddenFill xmlns:a14="http://schemas.microsoft.com/office/drawing/2010/main">
+                <a:solidFill>
+                  <a:srgbClr val="FFFFFF"/>
+                </a:solidFill>
+              </a14:hiddenFill>
+            </a:ext>
+          </a:extLst>
+        </p:spPr>
+      </p:pic>
+      <p:sp>
+        <p:nvSpPr>
+          <p:cNvPr id="15" name="Rounded Rectangle 14">
+            <a:extLst>
+              <a:ext uri="{FF2B5EF4-FFF2-40B4-BE49-F238E27FC236}">
+                <a16:creationId xmlns:a16="http://schemas.microsoft.com/office/drawing/2014/main" id="{454D503A-19DB-4749-80B1-51383AC59FFC}"/>
+              </a:ext>
+            </a:extLst>
+          </p:cNvPr>
+          <p:cNvSpPr/>
+          <p:nvPr/>
+        </p:nvSpPr>
+        <p:spPr>
+          <a:xfrm>
+            <a:off x="6904589" y="2335773"/>
+            <a:ext cx="1648019" cy="1070219"/>
+          </a:xfrm>
+          <a:prstGeom prst="roundRect">
+            <a:avLst/>
+          </a:prstGeom>
+          <a:ln w="38100">
+            <a:solidFill>
+              <a:srgbClr val="FF0000"/>
+            </a:solidFill>
+          </a:ln>
+        </p:spPr>
+        <p:style>
+          <a:lnRef idx="2">
+            <a:schemeClr val="accent2"/>
+          </a:lnRef>
+          <a:fillRef idx="1">
+            <a:schemeClr val="lt1"/>
+          </a:fillRef>
+          <a:effectRef idx="0">
+            <a:schemeClr val="accent2"/>
+          </a:effectRef>
+          <a:fontRef idx="minor">
+            <a:schemeClr val="dk1"/>
+          </a:fontRef>
+        </p:style>
+        <p:txBody>
+          <a:bodyPr rtlCol="0" anchor="ctr"/>
+          <a:lstStyle/>
+          <a:p>
+            <a:pPr algn="ctr"/>
+            <a:endParaRPr lang="en-US" sz="1100" dirty="0"/>
+          </a:p>
+          <a:p>
+            <a:pPr algn="ctr"/>
+            <a:endParaRPr lang="en-US" sz="1100" dirty="0"/>
+          </a:p>
+          <a:p>
+            <a:pPr algn="ctr"/>
+            <a:endParaRPr lang="en-US" sz="1100" dirty="0"/>
+          </a:p>
+          <a:p>
+            <a:pPr algn="ctr"/>
+            <a:r>
+              <a:rPr lang="en-US" sz="1100" dirty="0"/>
+              <a:t>Blank Subtraction &amp; Statistical Analysis</a:t>
+            </a:r>
+          </a:p>
+        </p:txBody>
+      </p:sp>
+      <p:pic>
+        <p:nvPicPr>
+          <p:cNvPr id="16" name="Picture 10" descr="The Python Logo | Python Software Foundation">
+            <a:extLst>
+              <a:ext uri="{FF2B5EF4-FFF2-40B4-BE49-F238E27FC236}">
+                <a16:creationId xmlns:a16="http://schemas.microsoft.com/office/drawing/2014/main" id="{7BAADD7A-6FAE-174A-B0C0-C22256694BE3}"/>
+              </a:ext>
+            </a:extLst>
+          </p:cNvPr>
+          <p:cNvPicPr>
+            <a:picLocks noChangeAspect="1" noChangeArrowheads="1"/>
+          </p:cNvPicPr>
+          <p:nvPr/>
+        </p:nvPicPr>
+        <p:blipFill>
+          <a:blip r:embed="rId7">
+            <a:extLst>
+              <a:ext uri="{28A0092B-C50C-407E-A947-70E740481C1C}">
+                <a14:useLocalDpi xmlns:a14="http://schemas.microsoft.com/office/drawing/2010/main" val="0"/>
+              </a:ext>
+            </a:extLst>
+          </a:blip>
+          <a:srcRect/>
+          <a:stretch>
+            <a:fillRect/>
+          </a:stretch>
+        </p:blipFill>
+        <p:spPr bwMode="auto">
+          <a:xfrm>
+            <a:off x="6974929" y="2401502"/>
+            <a:ext cx="1518973" cy="513064"/>
+          </a:xfrm>
+          <a:prstGeom prst="rect">
+            <a:avLst/>
+          </a:prstGeom>
+          <a:noFill/>
+          <a:extLst>
+            <a:ext uri="{909E8E84-426E-40DD-AFC4-6F175D3DCCD1}">
+              <a14:hiddenFill xmlns:a14="http://schemas.microsoft.com/office/drawing/2010/main">
+                <a:solidFill>
+                  <a:srgbClr val="FFFFFF"/>
+                </a:solidFill>
+              </a14:hiddenFill>
+            </a:ext>
+          </a:extLst>
+        </p:spPr>
+      </p:pic>
+      <p:sp>
+        <p:nvSpPr>
+          <p:cNvPr id="18" name="Rounded Rectangle 17">
+            <a:extLst>
+              <a:ext uri="{FF2B5EF4-FFF2-40B4-BE49-F238E27FC236}">
+                <a16:creationId xmlns:a16="http://schemas.microsoft.com/office/drawing/2014/main" id="{4C83D903-F22A-8842-BFDA-B413E170BBB8}"/>
+              </a:ext>
+            </a:extLst>
+          </p:cNvPr>
+          <p:cNvSpPr/>
+          <p:nvPr/>
+        </p:nvSpPr>
+        <p:spPr>
+          <a:xfrm>
+            <a:off x="8562978" y="5205987"/>
+            <a:ext cx="1648019" cy="1070219"/>
+          </a:xfrm>
+          <a:prstGeom prst="roundRect">
+            <a:avLst/>
+          </a:prstGeom>
+          <a:ln w="38100">
+            <a:solidFill>
+              <a:srgbClr val="FF0000"/>
+            </a:solidFill>
+          </a:ln>
+        </p:spPr>
+        <p:style>
+          <a:lnRef idx="2">
+            <a:schemeClr val="accent2"/>
+          </a:lnRef>
+          <a:fillRef idx="1">
+            <a:schemeClr val="lt1"/>
+          </a:fillRef>
+          <a:effectRef idx="0">
+            <a:schemeClr val="accent2"/>
+          </a:effectRef>
+          <a:fontRef idx="minor">
+            <a:schemeClr val="dk1"/>
+          </a:fontRef>
+        </p:style>
+        <p:txBody>
+          <a:bodyPr rtlCol="0" anchor="ctr"/>
+          <a:lstStyle/>
+          <a:p>
+            <a:pPr algn="ctr"/>
+            <a:endParaRPr lang="en-US" sz="1100" dirty="0"/>
+          </a:p>
+          <a:p>
+            <a:pPr algn="ctr"/>
+            <a:endParaRPr lang="en-US" sz="1100" dirty="0"/>
+          </a:p>
+          <a:p>
+            <a:pPr algn="ctr"/>
+            <a:endParaRPr lang="en-US" sz="1100" dirty="0"/>
+          </a:p>
+          <a:p>
+            <a:pPr algn="ctr"/>
+            <a:r>
+              <a:rPr lang="en-US" sz="1100" dirty="0"/>
+              <a:t>Report Generation</a:t>
+            </a:r>
+          </a:p>
+        </p:txBody>
+      </p:sp>
+      <p:pic>
+        <p:nvPicPr>
+          <p:cNvPr id="19" name="Picture 2" descr="Image result for multiqc logo">
+            <a:extLst>
+              <a:ext uri="{FF2B5EF4-FFF2-40B4-BE49-F238E27FC236}">
+                <a16:creationId xmlns:a16="http://schemas.microsoft.com/office/drawing/2014/main" id="{C1113770-D7F6-5A4D-B429-544EE28AAF7F}"/>
+              </a:ext>
+            </a:extLst>
+          </p:cNvPr>
+          <p:cNvPicPr>
+            <a:picLocks noChangeAspect="1" noChangeArrowheads="1"/>
+          </p:cNvPicPr>
+          <p:nvPr/>
+        </p:nvPicPr>
+        <p:blipFill>
+          <a:blip r:embed="rId8">
+            <a:extLst>
+              <a:ext uri="{28A0092B-C50C-407E-A947-70E740481C1C}">
+                <a14:useLocalDpi xmlns:a14="http://schemas.microsoft.com/office/drawing/2010/main" val="0"/>
+              </a:ext>
+            </a:extLst>
+          </a:blip>
+          <a:srcRect/>
+          <a:stretch>
+            <a:fillRect/>
+          </a:stretch>
+        </p:blipFill>
+        <p:spPr bwMode="auto">
+          <a:xfrm>
+            <a:off x="8723366" y="5418246"/>
+            <a:ext cx="1347047" cy="358019"/>
+          </a:xfrm>
+          <a:prstGeom prst="rect">
+            <a:avLst/>
+          </a:prstGeom>
+          <a:noFill/>
+          <a:extLst>
+            <a:ext uri="{909E8E84-426E-40DD-AFC4-6F175D3DCCD1}">
+              <a14:hiddenFill xmlns:a14="http://schemas.microsoft.com/office/drawing/2010/main">
+                <a:solidFill>
+                  <a:srgbClr val="FFFFFF"/>
+                </a:solidFill>
+              </a14:hiddenFill>
+            </a:ext>
+          </a:extLst>
+        </p:spPr>
+      </p:pic>
+      <p:sp>
+        <p:nvSpPr>
+          <p:cNvPr id="20" name="Rounded Rectangle 19">
+            <a:extLst>
+              <a:ext uri="{FF2B5EF4-FFF2-40B4-BE49-F238E27FC236}">
+                <a16:creationId xmlns:a16="http://schemas.microsoft.com/office/drawing/2014/main" id="{78225123-A838-8B46-AB87-C01AB6C22A61}"/>
+              </a:ext>
+            </a:extLst>
+          </p:cNvPr>
+          <p:cNvSpPr/>
+          <p:nvPr/>
+        </p:nvSpPr>
+        <p:spPr>
+          <a:xfrm>
+            <a:off x="10525525" y="5205987"/>
+            <a:ext cx="1648019" cy="1070219"/>
+          </a:xfrm>
+          <a:prstGeom prst="roundRect">
+            <a:avLst/>
+          </a:prstGeom>
+          <a:ln w="38100">
+            <a:solidFill>
+              <a:srgbClr val="FF0000"/>
+            </a:solidFill>
+          </a:ln>
+        </p:spPr>
+        <p:style>
+          <a:lnRef idx="2">
+            <a:schemeClr val="accent2"/>
+          </a:lnRef>
+          <a:fillRef idx="1">
+            <a:schemeClr val="lt1"/>
+          </a:fillRef>
+          <a:effectRef idx="0">
+            <a:schemeClr val="accent2"/>
+          </a:effectRef>
+          <a:fontRef idx="minor">
+            <a:schemeClr val="dk1"/>
+          </a:fontRef>
+        </p:style>
+        <p:txBody>
+          <a:bodyPr rtlCol="0" anchor="ctr"/>
+          <a:lstStyle/>
+          <a:p>
+            <a:pPr algn="ctr"/>
+            <a:endParaRPr lang="en-US" sz="1100" dirty="0"/>
+          </a:p>
+          <a:p>
+            <a:pPr algn="ctr"/>
+            <a:endParaRPr lang="en-US" sz="1100" dirty="0"/>
+          </a:p>
+          <a:p>
+            <a:pPr algn="ctr"/>
+            <a:endParaRPr lang="en-US" sz="1100" dirty="0"/>
+          </a:p>
+          <a:p>
+            <a:pPr algn="ctr"/>
+            <a:r>
+              <a:rPr lang="en-US" sz="1100" dirty="0"/>
+              <a:t>Pathway Analysis</a:t>
+            </a:r>
+          </a:p>
+        </p:txBody>
+      </p:sp>
+      <p:pic>
+        <p:nvPicPr>
+          <p:cNvPr id="21" name="Picture 20">
+            <a:extLst>
+              <a:ext uri="{FF2B5EF4-FFF2-40B4-BE49-F238E27FC236}">
+                <a16:creationId xmlns:a16="http://schemas.microsoft.com/office/drawing/2014/main" id="{BDE1CCE5-1F48-C642-89AA-8C8534970DA0}"/>
+              </a:ext>
+            </a:extLst>
+          </p:cNvPr>
+          <p:cNvPicPr>
+            <a:picLocks noChangeAspect="1"/>
+          </p:cNvPicPr>
+          <p:nvPr/>
+        </p:nvPicPr>
+        <p:blipFill>
+          <a:blip r:embed="rId9"/>
+          <a:stretch>
+            <a:fillRect/>
+          </a:stretch>
+        </p:blipFill>
+        <p:spPr>
+          <a:xfrm>
+            <a:off x="10607188" y="5297984"/>
+            <a:ext cx="1484692" cy="598541"/>
+          </a:xfrm>
+          <a:prstGeom prst="rect">
+            <a:avLst/>
+          </a:prstGeom>
+        </p:spPr>
+      </p:pic>
+      <p:sp>
+        <p:nvSpPr>
+          <p:cNvPr id="22" name="Notched Right Arrow 21">
+            <a:extLst>
+              <a:ext uri="{FF2B5EF4-FFF2-40B4-BE49-F238E27FC236}">
+                <a16:creationId xmlns:a16="http://schemas.microsoft.com/office/drawing/2014/main" id="{3AB9B073-3FEF-9C44-8BC7-2F3AFE214565}"/>
+              </a:ext>
+            </a:extLst>
+          </p:cNvPr>
+          <p:cNvSpPr/>
+          <p:nvPr/>
+        </p:nvSpPr>
+        <p:spPr>
+          <a:xfrm>
+            <a:off x="1351315" y="5469707"/>
+            <a:ext cx="218229" cy="297432"/>
+          </a:xfrm>
+          <a:prstGeom prst="notchedRightArrow">
+            <a:avLst/>
+          </a:prstGeom>
+          <a:noFill/>
+          <a:ln w="28575" cap="flat" cmpd="sng" algn="ctr">
+            <a:solidFill>
+              <a:srgbClr val="002060"/>
+            </a:solidFill>
+            <a:prstDash val="solid"/>
+            <a:round/>
+            <a:headEnd type="none" w="med" len="med"/>
+            <a:tailEnd type="none" w="med" len="med"/>
+          </a:ln>
+        </p:spPr>
+        <p:style>
+          <a:lnRef idx="0">
+            <a:scrgbClr r="0" g="0" b="0"/>
+          </a:lnRef>
+          <a:fillRef idx="0">
+            <a:scrgbClr r="0" g="0" b="0"/>
+          </a:fillRef>
+          <a:effectRef idx="0">
+            <a:scrgbClr r="0" g="0" b="0"/>
+          </a:effectRef>
+          <a:fontRef idx="minor">
+            <a:schemeClr val="dk1"/>
+          </a:fontRef>
+        </p:style>
+        <p:txBody>
+          <a:bodyPr rtlCol="0" anchor="ctr"/>
+          <a:lstStyle/>
+          <a:p>
+            <a:pPr algn="ctr"/>
+            <a:endParaRPr lang="en-US"/>
+          </a:p>
+        </p:txBody>
+      </p:sp>
+      <p:sp>
+        <p:nvSpPr>
+          <p:cNvPr id="23" name="Notched Right Arrow 22">
+            <a:extLst>
+              <a:ext uri="{FF2B5EF4-FFF2-40B4-BE49-F238E27FC236}">
+                <a16:creationId xmlns:a16="http://schemas.microsoft.com/office/drawing/2014/main" id="{1E75AF8E-BBD5-8E48-B88B-6FD1F930DE46}"/>
+              </a:ext>
+            </a:extLst>
+          </p:cNvPr>
+          <p:cNvSpPr/>
+          <p:nvPr/>
+        </p:nvSpPr>
+        <p:spPr>
+          <a:xfrm>
+            <a:off x="6635376" y="4154117"/>
+            <a:ext cx="218229" cy="297432"/>
+          </a:xfrm>
+          <a:prstGeom prst="notchedRightArrow">
+            <a:avLst/>
+          </a:prstGeom>
+          <a:noFill/>
+          <a:ln w="28575" cap="flat" cmpd="sng" algn="ctr">
+            <a:solidFill>
+              <a:srgbClr val="002060"/>
+            </a:solidFill>
+            <a:prstDash val="solid"/>
+            <a:round/>
+            <a:headEnd type="none" w="med" len="med"/>
+            <a:tailEnd type="none" w="med" len="med"/>
+          </a:ln>
+        </p:spPr>
+        <p:style>
+          <a:lnRef idx="0">
+            <a:scrgbClr r="0" g="0" b="0"/>
+          </a:lnRef>
+          <a:fillRef idx="0">
+            <a:scrgbClr r="0" g="0" b="0"/>
+          </a:fillRef>
+          <a:effectRef idx="0">
+            <a:scrgbClr r="0" g="0" b="0"/>
+          </a:effectRef>
+          <a:fontRef idx="minor">
+            <a:schemeClr val="dk1"/>
+          </a:fontRef>
+        </p:style>
+        <p:txBody>
+          <a:bodyPr rtlCol="0" anchor="ctr"/>
+          <a:lstStyle/>
+          <a:p>
+            <a:pPr algn="ctr"/>
+            <a:endParaRPr lang="en-US"/>
+          </a:p>
+        </p:txBody>
+      </p:sp>
+      <p:sp>
+        <p:nvSpPr>
+          <p:cNvPr id="24" name="Notched Right Arrow 23">
+            <a:extLst>
+              <a:ext uri="{FF2B5EF4-FFF2-40B4-BE49-F238E27FC236}">
+                <a16:creationId xmlns:a16="http://schemas.microsoft.com/office/drawing/2014/main" id="{5C2C52E6-1F19-504D-9E3B-5F70CBF1C061}"/>
+              </a:ext>
+            </a:extLst>
+          </p:cNvPr>
+          <p:cNvSpPr/>
+          <p:nvPr/>
+        </p:nvSpPr>
+        <p:spPr>
+          <a:xfrm rot="16200000">
+            <a:off x="7660614" y="3425203"/>
+            <a:ext cx="218229" cy="297432"/>
+          </a:xfrm>
+          <a:prstGeom prst="notchedRightArrow">
+            <a:avLst/>
+          </a:prstGeom>
+          <a:noFill/>
+          <a:ln w="28575" cap="flat" cmpd="sng" algn="ctr">
+            <a:solidFill>
+              <a:srgbClr val="002060"/>
+            </a:solidFill>
+            <a:prstDash val="solid"/>
+            <a:round/>
+            <a:headEnd type="none" w="med" len="med"/>
+            <a:tailEnd type="none" w="med" len="med"/>
+          </a:ln>
+        </p:spPr>
+        <p:style>
+          <a:lnRef idx="0">
+            <a:scrgbClr r="0" g="0" b="0"/>
+          </a:lnRef>
+          <a:fillRef idx="0">
+            <a:scrgbClr r="0" g="0" b="0"/>
+          </a:fillRef>
+          <a:effectRef idx="0">
+            <a:scrgbClr r="0" g="0" b="0"/>
+          </a:effectRef>
+          <a:fontRef idx="minor">
+            <a:schemeClr val="dk1"/>
+          </a:fontRef>
+        </p:style>
+        <p:txBody>
+          <a:bodyPr rtlCol="0" anchor="ctr"/>
+          <a:lstStyle/>
+          <a:p>
+            <a:pPr algn="ctr"/>
+            <a:endParaRPr lang="en-US"/>
+          </a:p>
+        </p:txBody>
+      </p:sp>
+      <p:sp>
+        <p:nvSpPr>
+          <p:cNvPr id="26" name="Notched Right Arrow 25">
+            <a:extLst>
+              <a:ext uri="{FF2B5EF4-FFF2-40B4-BE49-F238E27FC236}">
+                <a16:creationId xmlns:a16="http://schemas.microsoft.com/office/drawing/2014/main" id="{D3D0E2AE-DBBE-034F-B134-EDBAB1B08BE0}"/>
+              </a:ext>
+            </a:extLst>
+          </p:cNvPr>
+          <p:cNvSpPr/>
+          <p:nvPr/>
+        </p:nvSpPr>
+        <p:spPr>
+          <a:xfrm rot="2416297">
+            <a:off x="8808547" y="3444765"/>
+            <a:ext cx="218229" cy="297432"/>
+          </a:xfrm>
+          <a:prstGeom prst="notchedRightArrow">
+            <a:avLst/>
+          </a:prstGeom>
+          <a:noFill/>
+          <a:ln w="28575" cap="flat" cmpd="sng" algn="ctr">
+            <a:solidFill>
+              <a:srgbClr val="002060"/>
+            </a:solidFill>
+            <a:prstDash val="solid"/>
+            <a:round/>
+            <a:headEnd type="none" w="med" len="med"/>
+            <a:tailEnd type="none" w="med" len="med"/>
+          </a:ln>
+        </p:spPr>
+        <p:style>
+          <a:lnRef idx="0">
+            <a:scrgbClr r="0" g="0" b="0"/>
+          </a:lnRef>
+          <a:fillRef idx="0">
+            <a:scrgbClr r="0" g="0" b="0"/>
+          </a:fillRef>
+          <a:effectRef idx="0">
+            <a:scrgbClr r="0" g="0" b="0"/>
+          </a:effectRef>
+          <a:fontRef idx="minor">
+            <a:schemeClr val="dk1"/>
+          </a:fontRef>
+        </p:style>
+        <p:txBody>
+          <a:bodyPr rtlCol="0" anchor="ctr"/>
+          <a:lstStyle/>
+          <a:p>
+            <a:pPr algn="ctr"/>
+            <a:endParaRPr lang="en-US"/>
+          </a:p>
+        </p:txBody>
+      </p:sp>
+      <p:sp>
+        <p:nvSpPr>
+          <p:cNvPr id="27" name="Notched Right Arrow 26">
+            <a:extLst>
+              <a:ext uri="{FF2B5EF4-FFF2-40B4-BE49-F238E27FC236}">
+                <a16:creationId xmlns:a16="http://schemas.microsoft.com/office/drawing/2014/main" id="{AFB62160-384E-6A43-BF9E-253E7397E41C}"/>
+              </a:ext>
+            </a:extLst>
+          </p:cNvPr>
+          <p:cNvSpPr/>
+          <p:nvPr/>
+        </p:nvSpPr>
+        <p:spPr>
+          <a:xfrm rot="6539232">
+            <a:off x="9563495" y="4871348"/>
+            <a:ext cx="218229" cy="297432"/>
+          </a:xfrm>
+          <a:prstGeom prst="notchedRightArrow">
+            <a:avLst/>
+          </a:prstGeom>
+          <a:noFill/>
+          <a:ln w="28575" cap="flat" cmpd="sng" algn="ctr">
+            <a:solidFill>
+              <a:srgbClr val="002060"/>
+            </a:solidFill>
+            <a:prstDash val="solid"/>
+            <a:round/>
+            <a:headEnd type="none" w="med" len="med"/>
+            <a:tailEnd type="none" w="med" len="med"/>
+          </a:ln>
+        </p:spPr>
+        <p:style>
+          <a:lnRef idx="0">
+            <a:scrgbClr r="0" g="0" b="0"/>
+          </a:lnRef>
+          <a:fillRef idx="0">
+            <a:scrgbClr r="0" g="0" b="0"/>
+          </a:fillRef>
+          <a:effectRef idx="0">
+            <a:scrgbClr r="0" g="0" b="0"/>
+          </a:effectRef>
+          <a:fontRef idx="minor">
+            <a:schemeClr val="dk1"/>
+          </a:fontRef>
+        </p:style>
+        <p:txBody>
+          <a:bodyPr rtlCol="0" anchor="ctr"/>
+          <a:lstStyle/>
+          <a:p>
+            <a:pPr algn="ctr"/>
+            <a:endParaRPr lang="en-US"/>
+          </a:p>
+        </p:txBody>
+      </p:sp>
+      <p:sp>
+        <p:nvSpPr>
+          <p:cNvPr id="28" name="Notched Right Arrow 27">
+            <a:extLst>
+              <a:ext uri="{FF2B5EF4-FFF2-40B4-BE49-F238E27FC236}">
+                <a16:creationId xmlns:a16="http://schemas.microsoft.com/office/drawing/2014/main" id="{CEA0810D-1E6E-2C4D-ACFB-83B352A97E00}"/>
+              </a:ext>
+            </a:extLst>
+          </p:cNvPr>
+          <p:cNvSpPr/>
+          <p:nvPr/>
+        </p:nvSpPr>
+        <p:spPr>
+          <a:xfrm rot="2807306">
+            <a:off x="11006697" y="4826591"/>
+            <a:ext cx="218229" cy="297432"/>
+          </a:xfrm>
+          <a:prstGeom prst="notchedRightArrow">
+            <a:avLst/>
+          </a:prstGeom>
+          <a:noFill/>
+          <a:ln w="28575" cap="flat" cmpd="sng" algn="ctr">
+            <a:solidFill>
+              <a:srgbClr val="002060"/>
+            </a:solidFill>
+            <a:prstDash val="solid"/>
+            <a:round/>
+            <a:headEnd type="none" w="med" len="med"/>
+            <a:tailEnd type="none" w="med" len="med"/>
+          </a:ln>
+        </p:spPr>
+        <p:style>
+          <a:lnRef idx="0">
+            <a:scrgbClr r="0" g="0" b="0"/>
+          </a:lnRef>
+          <a:fillRef idx="0">
+            <a:scrgbClr r="0" g="0" b="0"/>
+          </a:fillRef>
+          <a:effectRef idx="0">
+            <a:scrgbClr r="0" g="0" b="0"/>
+          </a:effectRef>
+          <a:fontRef idx="minor">
+            <a:schemeClr val="dk1"/>
+          </a:fontRef>
+        </p:style>
+        <p:txBody>
+          <a:bodyPr rtlCol="0" anchor="ctr"/>
+          <a:lstStyle/>
+          <a:p>
+            <a:pPr algn="ctr"/>
+            <a:endParaRPr lang="en-US"/>
+          </a:p>
+        </p:txBody>
+      </p:sp>
+      <p:pic>
+        <p:nvPicPr>
+          <p:cNvPr id="29" name="Picture 4" descr="Image result for docker logo">
+            <a:extLst>
+              <a:ext uri="{FF2B5EF4-FFF2-40B4-BE49-F238E27FC236}">
+                <a16:creationId xmlns:a16="http://schemas.microsoft.com/office/drawing/2014/main" id="{E04B91F3-46D0-2249-BC1A-A96BF962EBCD}"/>
+              </a:ext>
+            </a:extLst>
+          </p:cNvPr>
+          <p:cNvPicPr>
+            <a:picLocks noChangeAspect="1" noChangeArrowheads="1"/>
+          </p:cNvPicPr>
+          <p:nvPr/>
+        </p:nvPicPr>
+        <p:blipFill>
+          <a:blip r:embed="rId10">
+            <a:extLst>
+              <a:ext uri="{28A0092B-C50C-407E-A947-70E740481C1C}">
+                <a14:useLocalDpi xmlns:a14="http://schemas.microsoft.com/office/drawing/2010/main" val="0"/>
+              </a:ext>
+            </a:extLst>
+          </a:blip>
+          <a:srcRect/>
+          <a:stretch>
+            <a:fillRect/>
+          </a:stretch>
+        </p:blipFill>
+        <p:spPr bwMode="auto">
+          <a:xfrm>
+            <a:off x="11459154" y="3599651"/>
+            <a:ext cx="1446923" cy="1237816"/>
+          </a:xfrm>
+          <a:prstGeom prst="rect">
+            <a:avLst/>
+          </a:prstGeom>
+          <a:noFill/>
+          <a:extLst>
+            <a:ext uri="{909E8E84-426E-40DD-AFC4-6F175D3DCCD1}">
+              <a14:hiddenFill xmlns:a14="http://schemas.microsoft.com/office/drawing/2010/main">
+                <a:solidFill>
+                  <a:srgbClr val="FFFFFF"/>
+                </a:solidFill>
+              </a14:hiddenFill>
+            </a:ext>
+          </a:extLst>
+        </p:spPr>
+      </p:pic>
+      <p:pic>
+        <p:nvPicPr>
+          <p:cNvPr id="31" name="Picture 2" descr="Image result for nextflow logo">
+            <a:extLst>
+              <a:ext uri="{FF2B5EF4-FFF2-40B4-BE49-F238E27FC236}">
+                <a16:creationId xmlns:a16="http://schemas.microsoft.com/office/drawing/2014/main" id="{3273647E-FAB3-BC48-86AF-3CC94FE6B345}"/>
+              </a:ext>
+            </a:extLst>
+          </p:cNvPr>
+          <p:cNvPicPr>
+            <a:picLocks noChangeAspect="1" noChangeArrowheads="1"/>
+          </p:cNvPicPr>
+          <p:nvPr/>
+        </p:nvPicPr>
+        <p:blipFill>
+          <a:blip r:embed="rId11">
+            <a:extLst>
+              <a:ext uri="{28A0092B-C50C-407E-A947-70E740481C1C}">
+                <a14:useLocalDpi xmlns:a14="http://schemas.microsoft.com/office/drawing/2010/main" val="0"/>
+              </a:ext>
+            </a:extLst>
+          </a:blip>
+          <a:srcRect/>
+          <a:stretch>
+            <a:fillRect/>
+          </a:stretch>
+        </p:blipFill>
+        <p:spPr bwMode="auto">
+          <a:xfrm>
+            <a:off x="4832363" y="5065597"/>
+            <a:ext cx="3263296" cy="655911"/>
+          </a:xfrm>
+          <a:prstGeom prst="rect">
+            <a:avLst/>
+          </a:prstGeom>
+          <a:noFill/>
+          <a:extLst>
+            <a:ext uri="{909E8E84-426E-40DD-AFC4-6F175D3DCCD1}">
+              <a14:hiddenFill xmlns:a14="http://schemas.microsoft.com/office/drawing/2010/main">
+                <a:solidFill>
+                  <a:srgbClr val="FFFFFF"/>
+                </a:solidFill>
+              </a14:hiddenFill>
+            </a:ext>
+          </a:extLst>
+        </p:spPr>
+      </p:pic>
+      <p:pic>
+        <p:nvPicPr>
+          <p:cNvPr id="32" name="Picture 16" descr="@bionitio-team">
+            <a:extLst>
+              <a:ext uri="{FF2B5EF4-FFF2-40B4-BE49-F238E27FC236}">
+                <a16:creationId xmlns:a16="http://schemas.microsoft.com/office/drawing/2014/main" id="{863F6AFE-263E-CB48-BE12-D03430883AD1}"/>
+              </a:ext>
+            </a:extLst>
+          </p:cNvPr>
+          <p:cNvPicPr>
+            <a:picLocks noChangeAspect="1" noChangeArrowheads="1"/>
+          </p:cNvPicPr>
+          <p:nvPr/>
+        </p:nvPicPr>
+        <p:blipFill>
+          <a:blip r:embed="rId12">
+            <a:extLst>
+              <a:ext uri="{28A0092B-C50C-407E-A947-70E740481C1C}">
+                <a14:useLocalDpi xmlns:a14="http://schemas.microsoft.com/office/drawing/2010/main" val="0"/>
+              </a:ext>
+            </a:extLst>
+          </a:blip>
+          <a:srcRect/>
+          <a:stretch>
+            <a:fillRect/>
+          </a:stretch>
+        </p:blipFill>
+        <p:spPr bwMode="auto">
+          <a:xfrm>
+            <a:off x="4485518" y="5664240"/>
+            <a:ext cx="1372774" cy="1372774"/>
+          </a:xfrm>
+          <a:prstGeom prst="rect">
+            <a:avLst/>
+          </a:prstGeom>
+          <a:noFill/>
+          <a:extLst>
+            <a:ext uri="{909E8E84-426E-40DD-AFC4-6F175D3DCCD1}">
+              <a14:hiddenFill xmlns:a14="http://schemas.microsoft.com/office/drawing/2010/main">
+                <a:solidFill>
+                  <a:srgbClr val="FFFFFF"/>
+                </a:solidFill>
+              </a14:hiddenFill>
+            </a:ext>
+          </a:extLst>
+        </p:spPr>
+      </p:pic>
+      <p:sp>
+        <p:nvSpPr>
+          <p:cNvPr id="34" name="Rounded Rectangle 33">
+            <a:extLst>
+              <a:ext uri="{FF2B5EF4-FFF2-40B4-BE49-F238E27FC236}">
+                <a16:creationId xmlns:a16="http://schemas.microsoft.com/office/drawing/2014/main" id="{A71152D8-EAB7-AD48-B957-9E56BADD2D82}"/>
+              </a:ext>
+            </a:extLst>
+          </p:cNvPr>
+          <p:cNvSpPr/>
+          <p:nvPr/>
+        </p:nvSpPr>
+        <p:spPr>
+          <a:xfrm>
+            <a:off x="3169792" y="3574489"/>
+            <a:ext cx="1438051" cy="1379095"/>
+          </a:xfrm>
+          <a:prstGeom prst="roundRect">
+            <a:avLst/>
+          </a:prstGeom>
+          <a:ln w="38100">
+            <a:solidFill>
+              <a:srgbClr val="FF0000"/>
+            </a:solidFill>
+          </a:ln>
+        </p:spPr>
+        <p:style>
+          <a:lnRef idx="2">
+            <a:schemeClr val="accent2"/>
+          </a:lnRef>
+          <a:fillRef idx="1">
+            <a:schemeClr val="lt1"/>
+          </a:fillRef>
+          <a:effectRef idx="0">
+            <a:schemeClr val="accent2"/>
+          </a:effectRef>
+          <a:fontRef idx="minor">
+            <a:schemeClr val="dk1"/>
+          </a:fontRef>
+        </p:style>
+        <p:txBody>
+          <a:bodyPr rtlCol="0" anchor="ctr"/>
+          <a:lstStyle/>
+          <a:p>
+            <a:pPr algn="ctr"/>
+            <a:endParaRPr lang="en-US" sz="1100" dirty="0"/>
+          </a:p>
+          <a:p>
+            <a:pPr algn="ctr"/>
+            <a:endParaRPr lang="en-US" sz="1100" dirty="0"/>
+          </a:p>
+          <a:p>
+            <a:pPr algn="ctr"/>
+            <a:endParaRPr lang="en-US" sz="1100" dirty="0"/>
+          </a:p>
+          <a:p>
+            <a:pPr algn="ctr"/>
+            <a:endParaRPr lang="en-US" sz="1100" dirty="0"/>
+          </a:p>
+          <a:p>
+            <a:pPr algn="ctr"/>
+            <a:r>
+              <a:rPr lang="en-US" sz="1100" dirty="0"/>
+              <a:t>Data Format Conversion</a:t>
+            </a:r>
+          </a:p>
+        </p:txBody>
+      </p:sp>
+      <p:pic>
+        <p:nvPicPr>
+          <p:cNvPr id="35" name="Picture 2">
+            <a:extLst>
+              <a:ext uri="{FF2B5EF4-FFF2-40B4-BE49-F238E27FC236}">
+                <a16:creationId xmlns:a16="http://schemas.microsoft.com/office/drawing/2014/main" id="{E9F2418C-8905-8946-AD54-D152F25FCBDB}"/>
+              </a:ext>
+            </a:extLst>
+          </p:cNvPr>
+          <p:cNvPicPr>
+            <a:picLocks noChangeAspect="1" noChangeArrowheads="1"/>
+          </p:cNvPicPr>
+          <p:nvPr/>
+        </p:nvPicPr>
+        <p:blipFill>
+          <a:blip r:embed="rId13">
+            <a:extLst>
+              <a:ext uri="{28A0092B-C50C-407E-A947-70E740481C1C}">
+                <a14:useLocalDpi xmlns:a14="http://schemas.microsoft.com/office/drawing/2010/main" val="0"/>
+              </a:ext>
+            </a:extLst>
+          </a:blip>
+          <a:srcRect/>
+          <a:stretch>
+            <a:fillRect/>
+          </a:stretch>
+        </p:blipFill>
+        <p:spPr bwMode="auto">
+          <a:xfrm>
+            <a:off x="3386988" y="3799308"/>
+            <a:ext cx="978223" cy="528769"/>
+          </a:xfrm>
+          <a:prstGeom prst="rect">
+            <a:avLst/>
+          </a:prstGeom>
+          <a:noFill/>
+          <a:extLst>
+            <a:ext uri="{909E8E84-426E-40DD-AFC4-6F175D3DCCD1}">
+              <a14:hiddenFill xmlns:a14="http://schemas.microsoft.com/office/drawing/2010/main">
+                <a:solidFill>
+                  <a:srgbClr val="FFFFFF"/>
+                </a:solidFill>
+              </a14:hiddenFill>
+            </a:ext>
+          </a:extLst>
+        </p:spPr>
+      </p:pic>
+      <p:sp>
+        <p:nvSpPr>
+          <p:cNvPr id="36" name="Notched Right Arrow 35">
+            <a:extLst>
+              <a:ext uri="{FF2B5EF4-FFF2-40B4-BE49-F238E27FC236}">
+                <a16:creationId xmlns:a16="http://schemas.microsoft.com/office/drawing/2014/main" id="{FDAC5C87-5692-8B4F-9B61-1AEE2AAD8CCD}"/>
+              </a:ext>
+            </a:extLst>
+          </p:cNvPr>
+          <p:cNvSpPr/>
+          <p:nvPr/>
+        </p:nvSpPr>
+        <p:spPr>
+          <a:xfrm>
+            <a:off x="4655935" y="4163576"/>
+            <a:ext cx="218229" cy="297432"/>
+          </a:xfrm>
+          <a:prstGeom prst="notchedRightArrow">
+            <a:avLst/>
+          </a:prstGeom>
+          <a:noFill/>
+          <a:ln w="28575" cap="flat" cmpd="sng" algn="ctr">
+            <a:solidFill>
+              <a:srgbClr val="002060"/>
+            </a:solidFill>
+            <a:prstDash val="solid"/>
+            <a:round/>
+            <a:headEnd type="none" w="med" len="med"/>
+            <a:tailEnd type="none" w="med" len="med"/>
+          </a:ln>
+        </p:spPr>
+        <p:style>
+          <a:lnRef idx="0">
+            <a:scrgbClr r="0" g="0" b="0"/>
+          </a:lnRef>
+          <a:fillRef idx="0">
+            <a:scrgbClr r="0" g="0" b="0"/>
+          </a:fillRef>
+          <a:effectRef idx="0">
+            <a:scrgbClr r="0" g="0" b="0"/>
+          </a:effectRef>
+          <a:fontRef idx="minor">
+            <a:schemeClr val="dk1"/>
+          </a:fontRef>
+        </p:style>
+        <p:txBody>
+          <a:bodyPr rtlCol="0" anchor="ctr"/>
+          <a:lstStyle/>
+          <a:p>
+            <a:pPr algn="ctr"/>
+            <a:endParaRPr lang="en-US"/>
+          </a:p>
+        </p:txBody>
+      </p:sp>
+      <p:sp>
+        <p:nvSpPr>
+          <p:cNvPr id="37" name="Rounded Rectangle 36">
+            <a:extLst>
+              <a:ext uri="{FF2B5EF4-FFF2-40B4-BE49-F238E27FC236}">
+                <a16:creationId xmlns:a16="http://schemas.microsoft.com/office/drawing/2014/main" id="{F226208D-BF03-9249-BB84-CC9D53AA4DE8}"/>
+              </a:ext>
+            </a:extLst>
+          </p:cNvPr>
+          <p:cNvSpPr/>
+          <p:nvPr/>
+        </p:nvSpPr>
+        <p:spPr>
+          <a:xfrm>
+            <a:off x="282397" y="2757619"/>
+            <a:ext cx="2364166" cy="1916491"/>
+          </a:xfrm>
+          <a:prstGeom prst="roundRect">
+            <a:avLst/>
+          </a:prstGeom>
+          <a:ln w="38100">
+            <a:solidFill>
+              <a:srgbClr val="FF0000"/>
+            </a:solidFill>
+          </a:ln>
+        </p:spPr>
+        <p:style>
+          <a:lnRef idx="2">
+            <a:schemeClr val="accent2"/>
+          </a:lnRef>
+          <a:fillRef idx="1">
+            <a:schemeClr val="lt1"/>
+          </a:fillRef>
+          <a:effectRef idx="0">
+            <a:schemeClr val="accent2"/>
+          </a:effectRef>
+          <a:fontRef idx="minor">
+            <a:schemeClr val="dk1"/>
+          </a:fontRef>
+        </p:style>
+        <p:txBody>
+          <a:bodyPr rtlCol="0" anchor="ctr"/>
+          <a:lstStyle/>
+          <a:p>
+            <a:pPr algn="ctr"/>
+            <a:endParaRPr lang="en-US" sz="1100" dirty="0"/>
+          </a:p>
+          <a:p>
+            <a:pPr algn="ctr"/>
+            <a:endParaRPr lang="en-US" sz="1100" dirty="0"/>
+          </a:p>
+          <a:p>
+            <a:pPr algn="ctr"/>
+            <a:endParaRPr lang="en-US" sz="1100" dirty="0"/>
+          </a:p>
+          <a:p>
+            <a:pPr algn="ctr"/>
+            <a:endParaRPr lang="en-US" sz="1100" dirty="0"/>
+          </a:p>
+          <a:p>
+            <a:pPr algn="ctr"/>
+            <a:endParaRPr lang="en-US" sz="1100" dirty="0"/>
+          </a:p>
+          <a:p>
+            <a:pPr algn="ctr"/>
+            <a:endParaRPr lang="en-US" sz="1100" dirty="0"/>
+          </a:p>
+          <a:p>
+            <a:pPr algn="ctr"/>
+            <a:endParaRPr lang="en-US" sz="1100" dirty="0"/>
+          </a:p>
+          <a:p>
+            <a:pPr algn="ctr"/>
+            <a:endParaRPr lang="en-US" sz="1100" dirty="0"/>
+          </a:p>
+          <a:p>
+            <a:pPr algn="ctr"/>
+            <a:r>
+              <a:rPr lang="en-US" sz="1100" dirty="0"/>
+              <a:t>Data Deposited to Public Repositories</a:t>
+            </a:r>
+          </a:p>
+        </p:txBody>
+      </p:sp>
+      <p:pic>
+        <p:nvPicPr>
+          <p:cNvPr id="38" name="Picture 4" descr="Congratulations! Dr. Shankar Subramaniam, on winning a major NIH grant on Metabolomics  Workbench! | Bioengineering">
+            <a:extLst>
+              <a:ext uri="{FF2B5EF4-FFF2-40B4-BE49-F238E27FC236}">
+                <a16:creationId xmlns:a16="http://schemas.microsoft.com/office/drawing/2014/main" id="{25741678-FDF7-0C40-9A3B-EE2A79BD377B}"/>
+              </a:ext>
+            </a:extLst>
+          </p:cNvPr>
+          <p:cNvPicPr>
+            <a:picLocks noChangeAspect="1" noChangeArrowheads="1"/>
+          </p:cNvPicPr>
+          <p:nvPr/>
+        </p:nvPicPr>
+        <p:blipFill>
+          <a:blip r:embed="rId14">
+            <a:extLst>
+              <a:ext uri="{28A0092B-C50C-407E-A947-70E740481C1C}">
+                <a14:useLocalDpi xmlns:a14="http://schemas.microsoft.com/office/drawing/2010/main" val="0"/>
+              </a:ext>
+            </a:extLst>
+          </a:blip>
+          <a:srcRect/>
+          <a:stretch>
+            <a:fillRect/>
+          </a:stretch>
+        </p:blipFill>
+        <p:spPr bwMode="auto">
+          <a:xfrm>
+            <a:off x="945727" y="2876497"/>
+            <a:ext cx="942316" cy="717764"/>
+          </a:xfrm>
+          <a:prstGeom prst="rect">
+            <a:avLst/>
+          </a:prstGeom>
+          <a:noFill/>
+          <a:extLst>
+            <a:ext uri="{909E8E84-426E-40DD-AFC4-6F175D3DCCD1}">
+              <a14:hiddenFill xmlns:a14="http://schemas.microsoft.com/office/drawing/2010/main">
+                <a:solidFill>
+                  <a:srgbClr val="FFFFFF"/>
+                </a:solidFill>
+              </a14:hiddenFill>
+            </a:ext>
+          </a:extLst>
+        </p:spPr>
+      </p:pic>
+      <p:pic>
+        <p:nvPicPr>
+          <p:cNvPr id="39" name="Picture 38" descr="A picture containing logo&#10;&#10;Description automatically generated">
+            <a:extLst>
+              <a:ext uri="{FF2B5EF4-FFF2-40B4-BE49-F238E27FC236}">
+                <a16:creationId xmlns:a16="http://schemas.microsoft.com/office/drawing/2014/main" id="{D157ACB4-89CB-D445-A989-3A9C88B36151}"/>
+              </a:ext>
+            </a:extLst>
+          </p:cNvPr>
+          <p:cNvPicPr>
+            <a:picLocks noChangeAspect="1"/>
+          </p:cNvPicPr>
+          <p:nvPr/>
+        </p:nvPicPr>
+        <p:blipFill>
+          <a:blip r:embed="rId15"/>
+          <a:stretch>
+            <a:fillRect/>
+          </a:stretch>
+        </p:blipFill>
+        <p:spPr>
+          <a:xfrm>
+            <a:off x="495330" y="3634010"/>
+            <a:ext cx="1861546" cy="483888"/>
+          </a:xfrm>
+          <a:prstGeom prst="rect">
+            <a:avLst/>
+          </a:prstGeom>
+        </p:spPr>
+      </p:pic>
+      <p:sp>
+        <p:nvSpPr>
+          <p:cNvPr id="40" name="Notched Right Arrow 39">
+            <a:extLst>
+              <a:ext uri="{FF2B5EF4-FFF2-40B4-BE49-F238E27FC236}">
+                <a16:creationId xmlns:a16="http://schemas.microsoft.com/office/drawing/2014/main" id="{CAFC4510-A1FB-E54F-8EA0-FD083F8210DF}"/>
+              </a:ext>
+            </a:extLst>
+          </p:cNvPr>
+          <p:cNvSpPr/>
+          <p:nvPr/>
+        </p:nvSpPr>
+        <p:spPr>
+          <a:xfrm>
+            <a:off x="2812082" y="4280043"/>
+            <a:ext cx="218229" cy="297432"/>
+          </a:xfrm>
+          <a:prstGeom prst="notchedRightArrow">
+            <a:avLst/>
+          </a:prstGeom>
+          <a:noFill/>
+          <a:ln w="28575" cap="flat" cmpd="sng" algn="ctr">
+            <a:solidFill>
+              <a:srgbClr val="002060"/>
+            </a:solidFill>
+            <a:prstDash val="solid"/>
+            <a:round/>
+            <a:headEnd type="none" w="med" len="med"/>
+            <a:tailEnd type="none" w="med" len="med"/>
+          </a:ln>
+        </p:spPr>
+        <p:style>
+          <a:lnRef idx="0">
+            <a:scrgbClr r="0" g="0" b="0"/>
+          </a:lnRef>
+          <a:fillRef idx="0">
+            <a:scrgbClr r="0" g="0" b="0"/>
+          </a:fillRef>
+          <a:effectRef idx="0">
+            <a:scrgbClr r="0" g="0" b="0"/>
+          </a:effectRef>
+          <a:fontRef idx="minor">
+            <a:schemeClr val="dk1"/>
+          </a:fontRef>
+        </p:style>
+        <p:txBody>
+          <a:bodyPr rtlCol="0" anchor="ctr"/>
+          <a:lstStyle/>
+          <a:p>
+            <a:pPr algn="ctr"/>
+            <a:endParaRPr lang="en-US"/>
+          </a:p>
+        </p:txBody>
+      </p:sp>
+      <p:sp>
+        <p:nvSpPr>
+          <p:cNvPr id="41" name="Rounded Rectangle 40">
+            <a:extLst>
+              <a:ext uri="{FF2B5EF4-FFF2-40B4-BE49-F238E27FC236}">
+                <a16:creationId xmlns:a16="http://schemas.microsoft.com/office/drawing/2014/main" id="{83E31BA9-76A8-6649-BA4F-C3E2A82E6EDF}"/>
+              </a:ext>
+            </a:extLst>
+          </p:cNvPr>
+          <p:cNvSpPr/>
+          <p:nvPr/>
+        </p:nvSpPr>
+        <p:spPr>
+          <a:xfrm>
+            <a:off x="3191726" y="5102958"/>
+            <a:ext cx="1416118" cy="737648"/>
+          </a:xfrm>
+          <a:prstGeom prst="roundRect">
+            <a:avLst/>
+          </a:prstGeom>
+          <a:ln w="38100">
+            <a:solidFill>
+              <a:srgbClr val="FF0000"/>
+            </a:solidFill>
+          </a:ln>
+        </p:spPr>
+        <p:style>
+          <a:lnRef idx="2">
+            <a:schemeClr val="accent2"/>
+          </a:lnRef>
+          <a:fillRef idx="1">
+            <a:schemeClr val="lt1"/>
+          </a:fillRef>
+          <a:effectRef idx="0">
+            <a:schemeClr val="accent2"/>
+          </a:effectRef>
+          <a:fontRef idx="minor">
+            <a:schemeClr val="dk1"/>
+          </a:fontRef>
+        </p:style>
+        <p:txBody>
+          <a:bodyPr rtlCol="0" anchor="ctr"/>
+          <a:lstStyle/>
+          <a:p>
+            <a:pPr algn="ctr"/>
+            <a:r>
+              <a:rPr lang="en-US" sz="1100" dirty="0"/>
+              <a:t>MODIS Data Quality Assessment</a:t>
+            </a:r>
+          </a:p>
+        </p:txBody>
+      </p:sp>
+      <p:pic>
+        <p:nvPicPr>
+          <p:cNvPr id="42" name="Picture 8" descr="GitHub logo PNG">
+            <a:extLst>
+              <a:ext uri="{FF2B5EF4-FFF2-40B4-BE49-F238E27FC236}">
+                <a16:creationId xmlns:a16="http://schemas.microsoft.com/office/drawing/2014/main" id="{C6E4F860-6E0F-A741-A09A-559EB5594C9F}"/>
+              </a:ext>
+            </a:extLst>
+          </p:cNvPr>
+          <p:cNvPicPr>
+            <a:picLocks noChangeAspect="1" noChangeArrowheads="1"/>
+          </p:cNvPicPr>
+          <p:nvPr/>
+        </p:nvPicPr>
+        <p:blipFill>
+          <a:blip r:embed="rId16">
+            <a:extLst>
+              <a:ext uri="{28A0092B-C50C-407E-A947-70E740481C1C}">
+                <a14:useLocalDpi xmlns:a14="http://schemas.microsoft.com/office/drawing/2010/main" val="0"/>
+              </a:ext>
+            </a:extLst>
+          </a:blip>
+          <a:srcRect/>
+          <a:stretch>
+            <a:fillRect/>
+          </a:stretch>
+        </p:blipFill>
+        <p:spPr bwMode="auto">
+          <a:xfrm>
+            <a:off x="3540176" y="2154198"/>
+            <a:ext cx="3144162" cy="1271245"/>
+          </a:xfrm>
+          <a:prstGeom prst="rect">
+            <a:avLst/>
+          </a:prstGeom>
+          <a:noFill/>
+          <a:extLst>
+            <a:ext uri="{909E8E84-426E-40DD-AFC4-6F175D3DCCD1}">
+              <a14:hiddenFill xmlns:a14="http://schemas.microsoft.com/office/drawing/2010/main">
+                <a:solidFill>
+                  <a:srgbClr val="FFFFFF"/>
+                </a:solidFill>
+              </a14:hiddenFill>
+            </a:ext>
+          </a:extLst>
+        </p:spPr>
+      </p:pic>
+      <p:pic>
+        <p:nvPicPr>
+          <p:cNvPr id="43" name="Picture 10" descr="Zenodo">
+            <a:extLst>
+              <a:ext uri="{FF2B5EF4-FFF2-40B4-BE49-F238E27FC236}">
+                <a16:creationId xmlns:a16="http://schemas.microsoft.com/office/drawing/2014/main" id="{2DCC32E2-54B7-C140-908F-B63F34FC2ACD}"/>
+              </a:ext>
+            </a:extLst>
+          </p:cNvPr>
+          <p:cNvPicPr>
+            <a:picLocks noChangeAspect="1" noChangeArrowheads="1"/>
+          </p:cNvPicPr>
+          <p:nvPr/>
+        </p:nvPicPr>
+        <p:blipFill>
+          <a:blip r:embed="rId17">
+            <a:extLst>
+              <a:ext uri="{28A0092B-C50C-407E-A947-70E740481C1C}">
+                <a14:useLocalDpi xmlns:a14="http://schemas.microsoft.com/office/drawing/2010/main" val="0"/>
+              </a:ext>
+            </a:extLst>
+          </a:blip>
+          <a:srcRect/>
+          <a:stretch>
+            <a:fillRect/>
+          </a:stretch>
+        </p:blipFill>
+        <p:spPr bwMode="auto">
+          <a:xfrm>
+            <a:off x="5436187" y="5768384"/>
+            <a:ext cx="2930505" cy="1172337"/>
+          </a:xfrm>
+          <a:prstGeom prst="rect">
+            <a:avLst/>
+          </a:prstGeom>
+          <a:noFill/>
+          <a:extLst>
+            <a:ext uri="{909E8E84-426E-40DD-AFC4-6F175D3DCCD1}">
+              <a14:hiddenFill xmlns:a14="http://schemas.microsoft.com/office/drawing/2010/main">
+                <a:solidFill>
+                  <a:srgbClr val="FFFFFF"/>
+                </a:solidFill>
+              </a14:hiddenFill>
+            </a:ext>
+          </a:extLst>
+        </p:spPr>
+      </p:pic>
+      <p:pic>
+        <p:nvPicPr>
+          <p:cNvPr id="44" name="Picture 12" descr="GitHub - sneumann/xcms: This is the git repository matching the  Bioconductor package xcms: LC/MS and GC/MS Data Analysis">
+            <a:extLst>
+              <a:ext uri="{FF2B5EF4-FFF2-40B4-BE49-F238E27FC236}">
+                <a16:creationId xmlns:a16="http://schemas.microsoft.com/office/drawing/2014/main" id="{82AC13B7-6E03-5040-A426-D1E81C20B55E}"/>
+              </a:ext>
+            </a:extLst>
+          </p:cNvPr>
+          <p:cNvPicPr>
+            <a:picLocks noChangeAspect="1" noChangeArrowheads="1"/>
+          </p:cNvPicPr>
+          <p:nvPr/>
+        </p:nvPicPr>
+        <p:blipFill>
+          <a:blip r:embed="rId18">
+            <a:extLst>
+              <a:ext uri="{28A0092B-C50C-407E-A947-70E740481C1C}">
+                <a14:useLocalDpi xmlns:a14="http://schemas.microsoft.com/office/drawing/2010/main" val="0"/>
+              </a:ext>
+            </a:extLst>
+          </a:blip>
+          <a:srcRect/>
+          <a:stretch>
+            <a:fillRect/>
+          </a:stretch>
+        </p:blipFill>
+        <p:spPr bwMode="auto">
+          <a:xfrm>
+            <a:off x="8159184" y="3862622"/>
+            <a:ext cx="528896" cy="612622"/>
+          </a:xfrm>
+          <a:prstGeom prst="rect">
+            <a:avLst/>
+          </a:prstGeom>
+          <a:noFill/>
+          <a:extLst>
+            <a:ext uri="{909E8E84-426E-40DD-AFC4-6F175D3DCCD1}">
+              <a14:hiddenFill xmlns:a14="http://schemas.microsoft.com/office/drawing/2010/main">
+                <a:solidFill>
+                  <a:srgbClr val="FFFFFF"/>
+                </a:solidFill>
+              </a14:hiddenFill>
+            </a:ext>
+          </a:extLst>
+        </p:spPr>
+      </p:pic>
+      <p:sp>
+        <p:nvSpPr>
+          <p:cNvPr id="45" name="Oval 44">
+            <a:extLst>
+              <a:ext uri="{FF2B5EF4-FFF2-40B4-BE49-F238E27FC236}">
+                <a16:creationId xmlns:a16="http://schemas.microsoft.com/office/drawing/2014/main" id="{D4D74AAC-C10C-9A49-A6F0-C4BB36FE0F4F}"/>
+              </a:ext>
+            </a:extLst>
+          </p:cNvPr>
+          <p:cNvSpPr/>
+          <p:nvPr/>
+        </p:nvSpPr>
+        <p:spPr>
+          <a:xfrm>
+            <a:off x="187207" y="2687850"/>
+            <a:ext cx="362857" cy="362857"/>
+          </a:xfrm>
+          <a:prstGeom prst="ellipse">
+            <a:avLst/>
+          </a:prstGeom>
+          <a:solidFill>
+            <a:schemeClr val="accent2"/>
+          </a:solidFill>
+          <a:ln w="19050">
+            <a:solidFill>
+              <a:schemeClr val="bg1"/>
+            </a:solidFill>
+          </a:ln>
+        </p:spPr>
+        <p:style>
+          <a:lnRef idx="2">
+            <a:schemeClr val="accent1">
+              <a:shade val="50000"/>
+            </a:schemeClr>
+          </a:lnRef>
+          <a:fillRef idx="1">
+            <a:schemeClr val="accent1"/>
+          </a:fillRef>
+          <a:effectRef idx="0">
+            <a:schemeClr val="accent1"/>
+          </a:effectRef>
+          <a:fontRef idx="minor">
+            <a:schemeClr val="lt1"/>
+          </a:fontRef>
+        </p:style>
+        <p:txBody>
+          <a:bodyPr rtlCol="0" anchor="ctr"/>
+          <a:lstStyle/>
+          <a:p>
+            <a:pPr algn="ctr"/>
+            <a:r>
+              <a:rPr lang="en-US" dirty="0"/>
+              <a:t>a</a:t>
+            </a:r>
+          </a:p>
+        </p:txBody>
+      </p:sp>
+      <p:sp>
+        <p:nvSpPr>
+          <p:cNvPr id="46" name="Oval 45">
+            <a:extLst>
+              <a:ext uri="{FF2B5EF4-FFF2-40B4-BE49-F238E27FC236}">
+                <a16:creationId xmlns:a16="http://schemas.microsoft.com/office/drawing/2014/main" id="{09AA46FA-DD10-F446-9496-1D7A51BDD616}"/>
+              </a:ext>
+            </a:extLst>
+          </p:cNvPr>
+          <p:cNvSpPr/>
+          <p:nvPr/>
+        </p:nvSpPr>
+        <p:spPr>
+          <a:xfrm>
+            <a:off x="146762" y="4800943"/>
+            <a:ext cx="362857" cy="362857"/>
+          </a:xfrm>
+          <a:prstGeom prst="ellipse">
+            <a:avLst/>
+          </a:prstGeom>
+          <a:solidFill>
+            <a:schemeClr val="accent2"/>
+          </a:solidFill>
+          <a:ln w="19050">
+            <a:solidFill>
+              <a:schemeClr val="bg1"/>
+            </a:solidFill>
+          </a:ln>
+        </p:spPr>
+        <p:style>
+          <a:lnRef idx="2">
+            <a:schemeClr val="accent1">
+              <a:shade val="50000"/>
+            </a:schemeClr>
+          </a:lnRef>
+          <a:fillRef idx="1">
+            <a:schemeClr val="accent1"/>
+          </a:fillRef>
+          <a:effectRef idx="0">
+            <a:schemeClr val="accent1"/>
+          </a:effectRef>
+          <a:fontRef idx="minor">
+            <a:schemeClr val="lt1"/>
+          </a:fontRef>
+        </p:style>
+        <p:txBody>
+          <a:bodyPr rtlCol="0" anchor="ctr"/>
+          <a:lstStyle/>
+          <a:p>
+            <a:pPr algn="ctr"/>
+            <a:r>
+              <a:rPr lang="en-US" dirty="0"/>
+              <a:t>b</a:t>
+            </a:r>
+          </a:p>
+        </p:txBody>
+      </p:sp>
+      <p:sp>
+        <p:nvSpPr>
+          <p:cNvPr id="47" name="Oval 46">
+            <a:extLst>
+              <a:ext uri="{FF2B5EF4-FFF2-40B4-BE49-F238E27FC236}">
+                <a16:creationId xmlns:a16="http://schemas.microsoft.com/office/drawing/2014/main" id="{480B7159-A880-B449-96C9-F7DB31901BCF}"/>
+              </a:ext>
+            </a:extLst>
+          </p:cNvPr>
+          <p:cNvSpPr/>
+          <p:nvPr/>
+        </p:nvSpPr>
+        <p:spPr>
+          <a:xfrm>
+            <a:off x="1502613" y="4783115"/>
+            <a:ext cx="362857" cy="362857"/>
+          </a:xfrm>
+          <a:prstGeom prst="ellipse">
+            <a:avLst/>
+          </a:prstGeom>
+          <a:solidFill>
+            <a:schemeClr val="accent2"/>
+          </a:solidFill>
+          <a:ln w="19050">
+            <a:solidFill>
+              <a:schemeClr val="bg1"/>
+            </a:solidFill>
+          </a:ln>
+        </p:spPr>
+        <p:style>
+          <a:lnRef idx="2">
+            <a:schemeClr val="accent1">
+              <a:shade val="50000"/>
+            </a:schemeClr>
+          </a:lnRef>
+          <a:fillRef idx="1">
+            <a:schemeClr val="accent1"/>
+          </a:fillRef>
+          <a:effectRef idx="0">
+            <a:schemeClr val="accent1"/>
+          </a:effectRef>
+          <a:fontRef idx="minor">
+            <a:schemeClr val="lt1"/>
+          </a:fontRef>
+        </p:style>
+        <p:txBody>
+          <a:bodyPr rtlCol="0" anchor="ctr"/>
+          <a:lstStyle/>
+          <a:p>
+            <a:pPr algn="ctr"/>
+            <a:r>
+              <a:rPr lang="en-US" dirty="0"/>
+              <a:t>c</a:t>
+            </a:r>
+          </a:p>
+        </p:txBody>
+      </p:sp>
+      <p:sp>
+        <p:nvSpPr>
+          <p:cNvPr id="48" name="Oval 47">
+            <a:extLst>
+              <a:ext uri="{FF2B5EF4-FFF2-40B4-BE49-F238E27FC236}">
+                <a16:creationId xmlns:a16="http://schemas.microsoft.com/office/drawing/2014/main" id="{823BD77D-821D-9846-8AA9-8DB09D7300D5}"/>
+              </a:ext>
+            </a:extLst>
+          </p:cNvPr>
+          <p:cNvSpPr/>
+          <p:nvPr/>
+        </p:nvSpPr>
+        <p:spPr>
+          <a:xfrm>
+            <a:off x="3121252" y="3473949"/>
+            <a:ext cx="362857" cy="362857"/>
+          </a:xfrm>
+          <a:prstGeom prst="ellipse">
+            <a:avLst/>
+          </a:prstGeom>
+          <a:solidFill>
+            <a:schemeClr val="accent2"/>
+          </a:solidFill>
+          <a:ln w="19050">
+            <a:solidFill>
+              <a:schemeClr val="bg1"/>
+            </a:solidFill>
+          </a:ln>
+        </p:spPr>
+        <p:style>
+          <a:lnRef idx="2">
+            <a:schemeClr val="accent1">
+              <a:shade val="50000"/>
+            </a:schemeClr>
+          </a:lnRef>
+          <a:fillRef idx="1">
+            <a:schemeClr val="accent1"/>
+          </a:fillRef>
+          <a:effectRef idx="0">
+            <a:schemeClr val="accent1"/>
+          </a:effectRef>
+          <a:fontRef idx="minor">
+            <a:schemeClr val="lt1"/>
+          </a:fontRef>
+        </p:style>
+        <p:txBody>
+          <a:bodyPr rtlCol="0" anchor="ctr"/>
+          <a:lstStyle/>
+          <a:p>
+            <a:pPr algn="ctr"/>
+            <a:r>
+              <a:rPr lang="en-US" dirty="0"/>
+              <a:t>d</a:t>
+            </a:r>
+          </a:p>
+        </p:txBody>
+      </p:sp>
+      <p:sp>
+        <p:nvSpPr>
+          <p:cNvPr id="49" name="Oval 48">
+            <a:extLst>
+              <a:ext uri="{FF2B5EF4-FFF2-40B4-BE49-F238E27FC236}">
+                <a16:creationId xmlns:a16="http://schemas.microsoft.com/office/drawing/2014/main" id="{9EE53849-37CD-9445-A514-2FEDB614A5DC}"/>
+              </a:ext>
+            </a:extLst>
+          </p:cNvPr>
+          <p:cNvSpPr/>
+          <p:nvPr/>
+        </p:nvSpPr>
+        <p:spPr>
+          <a:xfrm>
+            <a:off x="3128509" y="5614802"/>
+            <a:ext cx="362857" cy="362857"/>
+          </a:xfrm>
+          <a:prstGeom prst="ellipse">
+            <a:avLst/>
+          </a:prstGeom>
+          <a:solidFill>
+            <a:schemeClr val="accent2"/>
+          </a:solidFill>
+          <a:ln w="19050">
+            <a:solidFill>
+              <a:schemeClr val="bg1"/>
+            </a:solidFill>
+          </a:ln>
+        </p:spPr>
+        <p:style>
+          <a:lnRef idx="2">
+            <a:schemeClr val="accent1">
+              <a:shade val="50000"/>
+            </a:schemeClr>
+          </a:lnRef>
+          <a:fillRef idx="1">
+            <a:schemeClr val="accent1"/>
+          </a:fillRef>
+          <a:effectRef idx="0">
+            <a:schemeClr val="accent1"/>
+          </a:effectRef>
+          <a:fontRef idx="minor">
+            <a:schemeClr val="lt1"/>
+          </a:fontRef>
+        </p:style>
+        <p:txBody>
+          <a:bodyPr rtlCol="0" anchor="ctr"/>
+          <a:lstStyle/>
+          <a:p>
+            <a:pPr algn="ctr"/>
+            <a:r>
+              <a:rPr lang="en-US" dirty="0"/>
+              <a:t>e</a:t>
+            </a:r>
+          </a:p>
+        </p:txBody>
+      </p:sp>
+      <p:sp>
+        <p:nvSpPr>
+          <p:cNvPr id="50" name="Oval 49">
+            <a:extLst>
+              <a:ext uri="{FF2B5EF4-FFF2-40B4-BE49-F238E27FC236}">
+                <a16:creationId xmlns:a16="http://schemas.microsoft.com/office/drawing/2014/main" id="{1FB0D56C-6B86-564C-83D3-E0E6700249DC}"/>
+              </a:ext>
+            </a:extLst>
+          </p:cNvPr>
+          <p:cNvSpPr/>
+          <p:nvPr/>
+        </p:nvSpPr>
+        <p:spPr>
+          <a:xfrm>
+            <a:off x="4862674" y="3473948"/>
+            <a:ext cx="362857" cy="362857"/>
+          </a:xfrm>
+          <a:prstGeom prst="ellipse">
+            <a:avLst/>
+          </a:prstGeom>
+          <a:solidFill>
+            <a:schemeClr val="accent2"/>
+          </a:solidFill>
+          <a:ln w="19050">
+            <a:solidFill>
+              <a:schemeClr val="bg1"/>
+            </a:solidFill>
+          </a:ln>
+        </p:spPr>
+        <p:style>
+          <a:lnRef idx="2">
+            <a:schemeClr val="accent1">
+              <a:shade val="50000"/>
+            </a:schemeClr>
+          </a:lnRef>
+          <a:fillRef idx="1">
+            <a:schemeClr val="accent1"/>
+          </a:fillRef>
+          <a:effectRef idx="0">
+            <a:schemeClr val="accent1"/>
+          </a:effectRef>
+          <a:fontRef idx="minor">
+            <a:schemeClr val="lt1"/>
+          </a:fontRef>
+        </p:style>
+        <p:txBody>
+          <a:bodyPr rtlCol="0" anchor="ctr"/>
+          <a:lstStyle/>
+          <a:p>
+            <a:pPr algn="ctr"/>
+            <a:r>
+              <a:rPr lang="en-US" dirty="0"/>
+              <a:t>f</a:t>
+            </a:r>
+          </a:p>
+        </p:txBody>
+      </p:sp>
+      <p:sp>
+        <p:nvSpPr>
+          <p:cNvPr id="51" name="Oval 50">
+            <a:extLst>
+              <a:ext uri="{FF2B5EF4-FFF2-40B4-BE49-F238E27FC236}">
+                <a16:creationId xmlns:a16="http://schemas.microsoft.com/office/drawing/2014/main" id="{0B6DAF77-DA30-4846-A4D6-439FF1C89CBD}"/>
+              </a:ext>
+            </a:extLst>
+          </p:cNvPr>
+          <p:cNvSpPr/>
+          <p:nvPr/>
+        </p:nvSpPr>
+        <p:spPr>
+          <a:xfrm>
+            <a:off x="6772381" y="3634386"/>
+            <a:ext cx="362857" cy="362857"/>
+          </a:xfrm>
+          <a:prstGeom prst="ellipse">
+            <a:avLst/>
+          </a:prstGeom>
+          <a:solidFill>
+            <a:schemeClr val="accent2"/>
+          </a:solidFill>
+          <a:ln w="19050">
+            <a:solidFill>
+              <a:schemeClr val="bg1"/>
+            </a:solidFill>
+          </a:ln>
+        </p:spPr>
+        <p:style>
+          <a:lnRef idx="2">
+            <a:schemeClr val="accent1">
+              <a:shade val="50000"/>
+            </a:schemeClr>
+          </a:lnRef>
+          <a:fillRef idx="1">
+            <a:schemeClr val="accent1"/>
+          </a:fillRef>
+          <a:effectRef idx="0">
+            <a:schemeClr val="accent1"/>
+          </a:effectRef>
+          <a:fontRef idx="minor">
+            <a:schemeClr val="lt1"/>
+          </a:fontRef>
+        </p:style>
+        <p:txBody>
+          <a:bodyPr rtlCol="0" anchor="ctr"/>
+          <a:lstStyle/>
+          <a:p>
+            <a:pPr algn="ctr"/>
+            <a:r>
+              <a:rPr lang="en-US" dirty="0"/>
+              <a:t>g</a:t>
+            </a:r>
+          </a:p>
+        </p:txBody>
+      </p:sp>
+      <p:sp>
+        <p:nvSpPr>
+          <p:cNvPr id="52" name="Oval 51">
+            <a:extLst>
+              <a:ext uri="{FF2B5EF4-FFF2-40B4-BE49-F238E27FC236}">
+                <a16:creationId xmlns:a16="http://schemas.microsoft.com/office/drawing/2014/main" id="{43647CE1-362F-AE40-AE01-514E8B0EB137}"/>
+              </a:ext>
+            </a:extLst>
+          </p:cNvPr>
+          <p:cNvSpPr/>
+          <p:nvPr/>
+        </p:nvSpPr>
+        <p:spPr>
+          <a:xfrm>
+            <a:off x="6774205" y="2253207"/>
+            <a:ext cx="362857" cy="362857"/>
+          </a:xfrm>
+          <a:prstGeom prst="ellipse">
+            <a:avLst/>
+          </a:prstGeom>
+          <a:solidFill>
+            <a:schemeClr val="accent2"/>
+          </a:solidFill>
+          <a:ln w="19050">
+            <a:solidFill>
+              <a:schemeClr val="bg1"/>
+            </a:solidFill>
+          </a:ln>
+        </p:spPr>
+        <p:style>
+          <a:lnRef idx="2">
+            <a:schemeClr val="accent1">
+              <a:shade val="50000"/>
+            </a:schemeClr>
+          </a:lnRef>
+          <a:fillRef idx="1">
+            <a:schemeClr val="accent1"/>
+          </a:fillRef>
+          <a:effectRef idx="0">
+            <a:schemeClr val="accent1"/>
+          </a:effectRef>
+          <a:fontRef idx="minor">
+            <a:schemeClr val="lt1"/>
+          </a:fontRef>
+        </p:style>
+        <p:txBody>
+          <a:bodyPr rtlCol="0" anchor="ctr"/>
+          <a:lstStyle/>
+          <a:p>
+            <a:pPr algn="ctr"/>
+            <a:r>
+              <a:rPr lang="en-US" dirty="0"/>
+              <a:t>h</a:t>
+            </a:r>
+          </a:p>
+        </p:txBody>
+      </p:sp>
+      <p:sp>
+        <p:nvSpPr>
+          <p:cNvPr id="54" name="Oval 53">
+            <a:extLst>
+              <a:ext uri="{FF2B5EF4-FFF2-40B4-BE49-F238E27FC236}">
+                <a16:creationId xmlns:a16="http://schemas.microsoft.com/office/drawing/2014/main" id="{DAF70440-E302-7A42-804A-A649A4AFF566}"/>
+              </a:ext>
+            </a:extLst>
+          </p:cNvPr>
+          <p:cNvSpPr/>
+          <p:nvPr/>
+        </p:nvSpPr>
+        <p:spPr>
+          <a:xfrm>
+            <a:off x="9182749" y="3618720"/>
+            <a:ext cx="362857" cy="362857"/>
+          </a:xfrm>
+          <a:prstGeom prst="ellipse">
+            <a:avLst/>
+          </a:prstGeom>
+          <a:solidFill>
+            <a:schemeClr val="accent2"/>
+          </a:solidFill>
+          <a:ln w="19050">
+            <a:solidFill>
+              <a:schemeClr val="bg1"/>
+            </a:solidFill>
+          </a:ln>
+        </p:spPr>
+        <p:style>
+          <a:lnRef idx="2">
+            <a:schemeClr val="accent1">
+              <a:shade val="50000"/>
+            </a:schemeClr>
+          </a:lnRef>
+          <a:fillRef idx="1">
+            <a:schemeClr val="accent1"/>
+          </a:fillRef>
+          <a:effectRef idx="0">
+            <a:schemeClr val="accent1"/>
+          </a:effectRef>
+          <a:fontRef idx="minor">
+            <a:schemeClr val="lt1"/>
+          </a:fontRef>
+        </p:style>
+        <p:txBody>
+          <a:bodyPr rtlCol="0" anchor="ctr"/>
+          <a:lstStyle/>
+          <a:p>
+            <a:pPr algn="ctr"/>
+            <a:r>
+              <a:rPr lang="en-US" sz="1500" dirty="0"/>
+              <a:t>i</a:t>
+            </a:r>
+          </a:p>
+        </p:txBody>
+      </p:sp>
+      <p:sp>
+        <p:nvSpPr>
+          <p:cNvPr id="55" name="Oval 54">
+            <a:extLst>
+              <a:ext uri="{FF2B5EF4-FFF2-40B4-BE49-F238E27FC236}">
+                <a16:creationId xmlns:a16="http://schemas.microsoft.com/office/drawing/2014/main" id="{22EDAA79-6753-6841-8B7E-4F9672587E9B}"/>
+              </a:ext>
+            </a:extLst>
+          </p:cNvPr>
+          <p:cNvSpPr/>
+          <p:nvPr/>
+        </p:nvSpPr>
+        <p:spPr>
+          <a:xfrm>
+            <a:off x="8405482" y="5044873"/>
+            <a:ext cx="362857" cy="362857"/>
+          </a:xfrm>
+          <a:prstGeom prst="ellipse">
+            <a:avLst/>
+          </a:prstGeom>
+          <a:solidFill>
+            <a:schemeClr val="accent2"/>
+          </a:solidFill>
+          <a:ln w="19050">
+            <a:solidFill>
+              <a:schemeClr val="bg1"/>
+            </a:solidFill>
+          </a:ln>
+        </p:spPr>
+        <p:style>
+          <a:lnRef idx="2">
+            <a:schemeClr val="accent1">
+              <a:shade val="50000"/>
+            </a:schemeClr>
+          </a:lnRef>
+          <a:fillRef idx="1">
+            <a:schemeClr val="accent1"/>
+          </a:fillRef>
+          <a:effectRef idx="0">
+            <a:schemeClr val="accent1"/>
+          </a:effectRef>
+          <a:fontRef idx="minor">
+            <a:schemeClr val="lt1"/>
+          </a:fontRef>
+        </p:style>
+        <p:txBody>
+          <a:bodyPr rtlCol="0" anchor="ctr"/>
+          <a:lstStyle/>
+          <a:p>
+            <a:pPr algn="ctr"/>
+            <a:r>
+              <a:rPr lang="en-US" sz="1500" dirty="0"/>
+              <a:t>j</a:t>
+            </a:r>
+          </a:p>
+        </p:txBody>
+      </p:sp>
+      <p:sp>
+        <p:nvSpPr>
+          <p:cNvPr id="56" name="Oval 55">
+            <a:extLst>
+              <a:ext uri="{FF2B5EF4-FFF2-40B4-BE49-F238E27FC236}">
+                <a16:creationId xmlns:a16="http://schemas.microsoft.com/office/drawing/2014/main" id="{9A5C2A49-8C13-C548-ADFF-D3FEE3F9F791}"/>
+              </a:ext>
+            </a:extLst>
+          </p:cNvPr>
+          <p:cNvSpPr/>
+          <p:nvPr/>
+        </p:nvSpPr>
+        <p:spPr>
+          <a:xfrm>
+            <a:off x="10373008" y="5041932"/>
+            <a:ext cx="362857" cy="362857"/>
+          </a:xfrm>
+          <a:prstGeom prst="ellipse">
+            <a:avLst/>
+          </a:prstGeom>
+          <a:solidFill>
+            <a:schemeClr val="accent2"/>
+          </a:solidFill>
+          <a:ln w="19050">
+            <a:solidFill>
+              <a:schemeClr val="bg1"/>
+            </a:solidFill>
+          </a:ln>
+        </p:spPr>
+        <p:style>
+          <a:lnRef idx="2">
+            <a:schemeClr val="accent1">
+              <a:shade val="50000"/>
+            </a:schemeClr>
+          </a:lnRef>
+          <a:fillRef idx="1">
+            <a:schemeClr val="accent1"/>
+          </a:fillRef>
+          <a:effectRef idx="0">
+            <a:schemeClr val="accent1"/>
+          </a:effectRef>
+          <a:fontRef idx="minor">
+            <a:schemeClr val="lt1"/>
+          </a:fontRef>
+        </p:style>
+        <p:txBody>
+          <a:bodyPr rtlCol="0" anchor="ctr"/>
+          <a:lstStyle/>
+          <a:p>
+            <a:pPr algn="ctr"/>
+            <a:r>
+              <a:rPr lang="en-US" sz="1500" dirty="0"/>
+              <a:t>k</a:t>
+            </a:r>
+          </a:p>
+        </p:txBody>
+      </p:sp>
+      <p:sp>
+        <p:nvSpPr>
+          <p:cNvPr id="57" name="Rounded Rectangle 56">
+            <a:extLst>
+              <a:ext uri="{FF2B5EF4-FFF2-40B4-BE49-F238E27FC236}">
+                <a16:creationId xmlns:a16="http://schemas.microsoft.com/office/drawing/2014/main" id="{A98776FB-A1C6-E444-8FAC-7650BA3052A2}"/>
+              </a:ext>
+            </a:extLst>
+          </p:cNvPr>
+          <p:cNvSpPr/>
+          <p:nvPr/>
+        </p:nvSpPr>
+        <p:spPr>
+          <a:xfrm>
+            <a:off x="129151" y="2603806"/>
+            <a:ext cx="2638812" cy="3764603"/>
+          </a:xfrm>
+          <a:prstGeom prst="roundRect">
+            <a:avLst/>
+          </a:prstGeom>
+          <a:noFill/>
+          <a:ln w="28575">
+            <a:solidFill>
+              <a:srgbClr val="002060"/>
+            </a:solidFill>
+            <a:prstDash val="dash"/>
+          </a:ln>
+        </p:spPr>
+        <p:style>
+          <a:lnRef idx="2">
+            <a:schemeClr val="accent1">
+              <a:shade val="50000"/>
+            </a:schemeClr>
+          </a:lnRef>
+          <a:fillRef idx="1">
+            <a:schemeClr val="accent1"/>
+          </a:fillRef>
+          <a:effectRef idx="0">
+            <a:schemeClr val="accent1"/>
+          </a:effectRef>
+          <a:fontRef idx="minor">
+            <a:schemeClr val="lt1"/>
+          </a:fontRef>
+        </p:style>
+        <p:txBody>
+          <a:bodyPr rtlCol="0" anchor="ctr"/>
+          <a:lstStyle/>
+          <a:p>
+            <a:pPr algn="ctr"/>
+            <a:endParaRPr lang="en-US"/>
+          </a:p>
+        </p:txBody>
+      </p:sp>
+      <p:sp>
+        <p:nvSpPr>
+          <p:cNvPr id="58" name="Notched Right Arrow 57">
+            <a:extLst>
+              <a:ext uri="{FF2B5EF4-FFF2-40B4-BE49-F238E27FC236}">
+                <a16:creationId xmlns:a16="http://schemas.microsoft.com/office/drawing/2014/main" id="{B83AF76B-ECEF-CE4D-89D7-B713EF89553D}"/>
+              </a:ext>
+            </a:extLst>
+          </p:cNvPr>
+          <p:cNvSpPr/>
+          <p:nvPr/>
+        </p:nvSpPr>
+        <p:spPr>
+          <a:xfrm rot="16200000">
+            <a:off x="2011714" y="4635139"/>
+            <a:ext cx="218229" cy="297432"/>
+          </a:xfrm>
+          <a:prstGeom prst="notchedRightArrow">
+            <a:avLst/>
+          </a:prstGeom>
+          <a:noFill/>
+          <a:ln w="28575" cap="flat" cmpd="sng" algn="ctr">
+            <a:solidFill>
+              <a:srgbClr val="002060"/>
+            </a:solidFill>
+            <a:prstDash val="solid"/>
+            <a:round/>
+            <a:headEnd type="none" w="med" len="med"/>
+            <a:tailEnd type="none" w="med" len="med"/>
+          </a:ln>
+        </p:spPr>
+        <p:style>
+          <a:lnRef idx="0">
+            <a:scrgbClr r="0" g="0" b="0"/>
+          </a:lnRef>
+          <a:fillRef idx="0">
+            <a:scrgbClr r="0" g="0" b="0"/>
+          </a:fillRef>
+          <a:effectRef idx="0">
+            <a:scrgbClr r="0" g="0" b="0"/>
+          </a:effectRef>
+          <a:fontRef idx="minor">
+            <a:schemeClr val="dk1"/>
+          </a:fontRef>
+        </p:style>
+        <p:txBody>
+          <a:bodyPr rtlCol="0" anchor="ctr"/>
+          <a:lstStyle/>
+          <a:p>
+            <a:pPr algn="ctr"/>
+            <a:endParaRPr lang="en-US"/>
+          </a:p>
+        </p:txBody>
+      </p:sp>
+      <p:pic>
+        <p:nvPicPr>
+          <p:cNvPr id="1026" name="Picture 2" descr="PRIMe: Platform for RIKEN Metabolomics">
+            <a:extLst>
+              <a:ext uri="{FF2B5EF4-FFF2-40B4-BE49-F238E27FC236}">
+                <a16:creationId xmlns:a16="http://schemas.microsoft.com/office/drawing/2014/main" id="{38CC9EEF-C9C7-A047-BBC5-EE2AFCA2932A}"/>
+              </a:ext>
+            </a:extLst>
+          </p:cNvPr>
+          <p:cNvPicPr>
+            <a:picLocks noChangeAspect="1" noChangeArrowheads="1"/>
+          </p:cNvPicPr>
+          <p:nvPr/>
+        </p:nvPicPr>
+        <p:blipFill>
+          <a:blip r:embed="rId19">
+            <a:extLst>
+              <a:ext uri="{28A0092B-C50C-407E-A947-70E740481C1C}">
+                <a14:useLocalDpi xmlns:a14="http://schemas.microsoft.com/office/drawing/2010/main" val="0"/>
+              </a:ext>
+            </a:extLst>
+          </a:blip>
+          <a:srcRect/>
+          <a:stretch>
+            <a:fillRect/>
+          </a:stretch>
+        </p:blipFill>
+        <p:spPr bwMode="auto">
+          <a:xfrm>
+            <a:off x="7080979" y="4115721"/>
+            <a:ext cx="899066" cy="424712"/>
+          </a:xfrm>
+          <a:prstGeom prst="rect">
+            <a:avLst/>
+          </a:prstGeom>
+          <a:noFill/>
+          <a:extLst>
+            <a:ext uri="{909E8E84-426E-40DD-AFC4-6F175D3DCCD1}">
+              <a14:hiddenFill xmlns:a14="http://schemas.microsoft.com/office/drawing/2010/main">
+                <a:solidFill>
+                  <a:srgbClr val="FFFFFF"/>
+                </a:solidFill>
+              </a14:hiddenFill>
+            </a:ext>
+          </a:extLst>
+        </p:spPr>
+      </p:pic>
+      <p:pic>
+        <p:nvPicPr>
+          <p:cNvPr id="1028" name="Picture 4" descr="nf-core">
+            <a:extLst>
+              <a:ext uri="{FF2B5EF4-FFF2-40B4-BE49-F238E27FC236}">
+                <a16:creationId xmlns:a16="http://schemas.microsoft.com/office/drawing/2014/main" id="{EE7DA729-7494-9E40-9D56-FCA7F88CEC5C}"/>
+              </a:ext>
+            </a:extLst>
+          </p:cNvPr>
+          <p:cNvPicPr>
+            <a:picLocks noChangeAspect="1" noChangeArrowheads="1"/>
+          </p:cNvPicPr>
+          <p:nvPr/>
+        </p:nvPicPr>
+        <p:blipFill>
+          <a:blip r:embed="rId20">
+            <a:extLst>
+              <a:ext uri="{28A0092B-C50C-407E-A947-70E740481C1C}">
+                <a14:useLocalDpi xmlns:a14="http://schemas.microsoft.com/office/drawing/2010/main" val="0"/>
+              </a:ext>
+            </a:extLst>
+          </a:blip>
+          <a:srcRect/>
+          <a:stretch>
+            <a:fillRect/>
+          </a:stretch>
+        </p:blipFill>
+        <p:spPr bwMode="auto">
+          <a:xfrm>
+            <a:off x="8768339" y="2425973"/>
+            <a:ext cx="2773646" cy="722320"/>
+          </a:xfrm>
+          <a:prstGeom prst="rect">
+            <a:avLst/>
+          </a:prstGeom>
+          <a:noFill/>
+          <a:extLst>
+            <a:ext uri="{909E8E84-426E-40DD-AFC4-6F175D3DCCD1}">
+              <a14:hiddenFill xmlns:a14="http://schemas.microsoft.com/office/drawing/2010/main">
+                <a:solidFill>
+                  <a:srgbClr val="FFFFFF"/>
+                </a:solidFill>
+              </a14:hiddenFill>
+            </a:ext>
+          </a:extLst>
+        </p:spPr>
+      </p:pic>
+    </p:spTree>
+    <p:extLst>
+      <p:ext uri="{BB962C8B-B14F-4D97-AF65-F5344CB8AC3E}">
+        <p14:creationId xmlns:p14="http://schemas.microsoft.com/office/powerpoint/2010/main" val="838004511"/>
+      </p:ext>
+    </p:extLst>
+  </p:cSld>
+  <p:clrMapOvr>
+    <a:masterClrMapping/>
+  </p:clrMapOvr>
+</p:sld>
+</file>
+
 <file path=ppt/theme/theme1.xml><?xml version="1.0" encoding="utf-8"?>
 <a:theme xmlns:a="http://schemas.openxmlformats.org/drawingml/2006/main" name="Office Theme">
   <a:themeElements>

</xml_diff>